<commit_message>
update ppts and pdfs
</commit_message>
<xml_diff>
--- a/powerpoint files/Session2.pptx
+++ b/powerpoint files/Session2.pptx
@@ -124,7 +124,18 @@
   </p:defaultTextStyle>
   <p:extLst>
     <p:ext uri="{EFAFB233-063F-42B5-8137-9DF3F51BA10A}">
-      <p15:sldGuideLst xmlns:p15="http://schemas.microsoft.com/office/powerpoint/2012/main" xmlns=""/>
+      <p15:sldGuideLst xmlns:p15="http://schemas.microsoft.com/office/powerpoint/2012/main">
+        <p15:guide id="1" orient="horz" pos="2160">
+          <p15:clr>
+            <a:srgbClr val="A4A3A4"/>
+          </p15:clr>
+        </p15:guide>
+        <p15:guide id="2" pos="2880">
+          <p15:clr>
+            <a:srgbClr val="A4A3A4"/>
+          </p15:clr>
+        </p15:guide>
+      </p15:sldGuideLst>
     </p:ext>
   </p:extLst>
 </p:presentation>
@@ -1210,7 +1221,7 @@
           <a:p>
             <a:fld id="{927AE14A-E53B-F74F-B5AA-37C2AC2703D1}" type="datetimeFigureOut">
               <a:rPr lang="en-US" smtClean="0"/>
-              <a:t>06/07/21</a:t>
+              <a:t>11/22/2021</a:t>
             </a:fld>
             <a:endParaRPr lang="en-US"/>
           </a:p>
@@ -1380,7 +1391,7 @@
           <a:p>
             <a:fld id="{927AE14A-E53B-F74F-B5AA-37C2AC2703D1}" type="datetimeFigureOut">
               <a:rPr lang="en-US" smtClean="0"/>
-              <a:t>06/07/21</a:t>
+              <a:t>11/22/2021</a:t>
             </a:fld>
             <a:endParaRPr lang="en-US"/>
           </a:p>
@@ -1560,7 +1571,7 @@
           <a:p>
             <a:fld id="{927AE14A-E53B-F74F-B5AA-37C2AC2703D1}" type="datetimeFigureOut">
               <a:rPr lang="en-US" smtClean="0"/>
-              <a:t>06/07/21</a:t>
+              <a:t>11/22/2021</a:t>
             </a:fld>
             <a:endParaRPr lang="en-US"/>
           </a:p>
@@ -1921,7 +1932,7 @@
           <a:p>
             <a:fld id="{927AE14A-E53B-F74F-B5AA-37C2AC2703D1}" type="datetimeFigureOut">
               <a:rPr lang="en-US" smtClean="0"/>
-              <a:t>06/07/21</a:t>
+              <a:t>11/22/2021</a:t>
             </a:fld>
             <a:endParaRPr lang="en-US"/>
           </a:p>
@@ -2167,7 +2178,7 @@
           <a:p>
             <a:fld id="{927AE14A-E53B-F74F-B5AA-37C2AC2703D1}" type="datetimeFigureOut">
               <a:rPr lang="en-US" smtClean="0"/>
-              <a:t>06/07/21</a:t>
+              <a:t>11/22/2021</a:t>
             </a:fld>
             <a:endParaRPr lang="en-US"/>
           </a:p>
@@ -2455,7 +2466,7 @@
           <a:p>
             <a:fld id="{927AE14A-E53B-F74F-B5AA-37C2AC2703D1}" type="datetimeFigureOut">
               <a:rPr lang="en-US" smtClean="0"/>
-              <a:t>06/07/21</a:t>
+              <a:t>11/22/2021</a:t>
             </a:fld>
             <a:endParaRPr lang="en-US"/>
           </a:p>
@@ -2877,7 +2888,7 @@
           <a:p>
             <a:fld id="{927AE14A-E53B-F74F-B5AA-37C2AC2703D1}" type="datetimeFigureOut">
               <a:rPr lang="en-US" smtClean="0"/>
-              <a:t>06/07/21</a:t>
+              <a:t>11/22/2021</a:t>
             </a:fld>
             <a:endParaRPr lang="en-US"/>
           </a:p>
@@ -2995,7 +3006,7 @@
           <a:p>
             <a:fld id="{927AE14A-E53B-F74F-B5AA-37C2AC2703D1}" type="datetimeFigureOut">
               <a:rPr lang="en-US" smtClean="0"/>
-              <a:t>06/07/21</a:t>
+              <a:t>11/22/2021</a:t>
             </a:fld>
             <a:endParaRPr lang="en-US"/>
           </a:p>
@@ -3090,7 +3101,7 @@
           <a:p>
             <a:fld id="{927AE14A-E53B-F74F-B5AA-37C2AC2703D1}" type="datetimeFigureOut">
               <a:rPr lang="en-US" smtClean="0"/>
-              <a:t>06/07/21</a:t>
+              <a:t>11/22/2021</a:t>
             </a:fld>
             <a:endParaRPr lang="en-US"/>
           </a:p>
@@ -3367,7 +3378,7 @@
           <a:p>
             <a:fld id="{927AE14A-E53B-F74F-B5AA-37C2AC2703D1}" type="datetimeFigureOut">
               <a:rPr lang="en-US" smtClean="0"/>
-              <a:t>06/07/21</a:t>
+              <a:t>11/22/2021</a:t>
             </a:fld>
             <a:endParaRPr lang="en-US"/>
           </a:p>
@@ -3620,7 +3631,7 @@
           <a:p>
             <a:fld id="{927AE14A-E53B-F74F-B5AA-37C2AC2703D1}" type="datetimeFigureOut">
               <a:rPr lang="en-US" smtClean="0"/>
-              <a:t>06/07/21</a:t>
+              <a:t>11/22/2021</a:t>
             </a:fld>
             <a:endParaRPr lang="en-US"/>
           </a:p>
@@ -3833,7 +3844,7 @@
           <a:p>
             <a:fld id="{927AE14A-E53B-F74F-B5AA-37C2AC2703D1}" type="datetimeFigureOut">
               <a:rPr lang="en-US" smtClean="0"/>
-              <a:t>06/07/21</a:t>
+              <a:t>11/22/2021</a:t>
             </a:fld>
             <a:endParaRPr lang="en-US"/>
           </a:p>
@@ -4294,38 +4305,20 @@
           </a:p>
           <a:p>
             <a:r>
-              <a:rPr lang="en-US" dirty="0" smtClean="0">
+              <a:rPr lang="en-US" dirty="0" err="1">
                 <a:cs typeface="Calibri"/>
               </a:rPr>
-              <a:t>07</a:t>
-            </a:r>
-            <a:r>
-              <a:rPr lang="en-US" dirty="0" smtClean="0">
+              <a:t>Michaelmas</a:t>
+            </a:r>
+            <a:r>
+              <a:rPr lang="en-US">
                 <a:cs typeface="Calibri"/>
               </a:rPr>
-              <a:t>/07/</a:t>
-            </a:r>
-            <a:r>
-              <a:rPr lang="en-US" dirty="0">
-                <a:cs typeface="Calibri"/>
-              </a:rPr>
-              <a:t>2021</a:t>
-            </a:r>
-            <a:endParaRPr lang="en-US" dirty="0"/>
-          </a:p>
-          <a:p>
-            <a:r>
-              <a:rPr lang="en-US" dirty="0" smtClean="0">
-                <a:cs typeface="Calibri"/>
-              </a:rPr>
-              <a:t>Summer </a:t>
-            </a:r>
-            <a:r>
-              <a:rPr lang="en-US" dirty="0">
-                <a:cs typeface="Calibri"/>
-              </a:rPr>
-              <a:t>2021</a:t>
-            </a:r>
+              <a:t> 2021</a:t>
+            </a:r>
+            <a:endParaRPr lang="en-US" dirty="0">
+              <a:cs typeface="Calibri"/>
+            </a:endParaRPr>
           </a:p>
         </p:txBody>
       </p:sp>
@@ -4364,7 +4357,7 @@
           <p:cNvPr id="255" name="Title 1">
             <a:extLst>
               <a:ext uri="{FF2B5EF4-FFF2-40B4-BE49-F238E27FC236}">
-                <a16:creationId xmlns:a16="http://schemas.microsoft.com/office/drawing/2014/main" xmlns="" id="{B54C3232-AE34-455E-BD45-D58574BAEE43}"/>
+                <a16:creationId xmlns:a16="http://schemas.microsoft.com/office/drawing/2014/main" id="{B54C3232-AE34-455E-BD45-D58574BAEE43}"/>
               </a:ext>
             </a:extLst>
           </p:cNvPr>
@@ -4443,7 +4436,7 @@
           <p:cNvPr id="4" name="Picture 3">
             <a:extLst>
               <a:ext uri="{FF2B5EF4-FFF2-40B4-BE49-F238E27FC236}">
-                <a16:creationId xmlns:a16="http://schemas.microsoft.com/office/drawing/2014/main" xmlns="" id="{5B3D7142-5608-4701-8968-063E5E171D97}"/>
+                <a16:creationId xmlns:a16="http://schemas.microsoft.com/office/drawing/2014/main" id="{5B3D7142-5608-4701-8968-063E5E171D97}"/>
               </a:ext>
             </a:extLst>
           </p:cNvPr>
@@ -4473,7 +4466,7 @@
           <p:cNvPr id="1026" name="Picture 2" descr="figure3">
             <a:extLst>
               <a:ext uri="{FF2B5EF4-FFF2-40B4-BE49-F238E27FC236}">
-                <a16:creationId xmlns:a16="http://schemas.microsoft.com/office/drawing/2014/main" xmlns="" id="{C5A88CB2-2B1E-48E6-9B80-82467E660F0E}"/>
+                <a16:creationId xmlns:a16="http://schemas.microsoft.com/office/drawing/2014/main" id="{C5A88CB2-2B1E-48E6-9B80-82467E660F0E}"/>
               </a:ext>
             </a:extLst>
           </p:cNvPr>
@@ -4506,7 +4499,7 @@
           <a:noFill/>
           <a:extLst>
             <a:ext uri="{909E8E84-426E-40dd-AFC4-6F175D3DCCD1}">
-              <a14:hiddenFill xmlns:a14="http://schemas.microsoft.com/office/drawing/2010/main">
+              <a14:hiddenFill xmlns:a14="http://schemas.microsoft.com/office/drawing/2010/main" xmlns="">
                 <a:solidFill>
                   <a:srgbClr val="FFFFFF"/>
                 </a:solidFill>
@@ -4520,7 +4513,7 @@
           <p:cNvPr id="5" name="TextBox 4">
             <a:extLst>
               <a:ext uri="{FF2B5EF4-FFF2-40B4-BE49-F238E27FC236}">
-                <a16:creationId xmlns:a16="http://schemas.microsoft.com/office/drawing/2014/main" xmlns="" id="{48920BC3-2F92-4C82-ABB1-686F9E80FA72}"/>
+                <a16:creationId xmlns:a16="http://schemas.microsoft.com/office/drawing/2014/main" id="{48920BC3-2F92-4C82-ABB1-686F9E80FA72}"/>
               </a:ext>
             </a:extLst>
           </p:cNvPr>
@@ -4630,7 +4623,7 @@
   <p:timing>
     <p:tnLst>
       <p:par>
-        <p:cTn xmlns:p14="http://schemas.microsoft.com/office/powerpoint/2010/main" id="1" dur="indefinite" restart="never" nodeType="tmRoot">
+        <p:cTn id="1" dur="indefinite" restart="never" nodeType="tmRoot">
           <p:childTnLst>
             <p:seq concurrent="1" nextAc="seek">
               <p:cTn id="2" dur="indefinite" nodeType="mainSeq">
@@ -4775,7 +4768,7 @@
           <p:cNvPr id="100" name="TextBox 99">
             <a:extLst>
               <a:ext uri="{FF2B5EF4-FFF2-40B4-BE49-F238E27FC236}">
-                <a16:creationId xmlns:a16="http://schemas.microsoft.com/office/drawing/2014/main" xmlns="" id="{34B35484-F4E2-4112-97FB-FBF571F70843}"/>
+                <a16:creationId xmlns:a16="http://schemas.microsoft.com/office/drawing/2014/main" id="{34B35484-F4E2-4112-97FB-FBF571F70843}"/>
               </a:ext>
             </a:extLst>
           </p:cNvPr>
@@ -4840,7 +4833,7 @@
           <p:cNvPr id="101" name="TextBox 100">
             <a:extLst>
               <a:ext uri="{FF2B5EF4-FFF2-40B4-BE49-F238E27FC236}">
-                <a16:creationId xmlns:a16="http://schemas.microsoft.com/office/drawing/2014/main" xmlns="" id="{5CBC9EEB-E16D-4762-B6F3-51F67C9FCE01}"/>
+                <a16:creationId xmlns:a16="http://schemas.microsoft.com/office/drawing/2014/main" id="{5CBC9EEB-E16D-4762-B6F3-51F67C9FCE01}"/>
               </a:ext>
             </a:extLst>
           </p:cNvPr>
@@ -4905,7 +4898,7 @@
           <p:cNvPr id="105" name="Rectangle 104">
             <a:extLst>
               <a:ext uri="{FF2B5EF4-FFF2-40B4-BE49-F238E27FC236}">
-                <a16:creationId xmlns:a16="http://schemas.microsoft.com/office/drawing/2014/main" xmlns="" id="{2E97DFEC-6564-46D2-BD99-45CA5B83B84A}"/>
+                <a16:creationId xmlns:a16="http://schemas.microsoft.com/office/drawing/2014/main" id="{2E97DFEC-6564-46D2-BD99-45CA5B83B84A}"/>
               </a:ext>
             </a:extLst>
           </p:cNvPr>
@@ -4980,7 +4973,7 @@
           <p:cNvPr id="106" name="Rectangle 105">
             <a:extLst>
               <a:ext uri="{FF2B5EF4-FFF2-40B4-BE49-F238E27FC236}">
-                <a16:creationId xmlns:a16="http://schemas.microsoft.com/office/drawing/2014/main" xmlns="" id="{DF4AD769-5634-43C4-B8A9-1F2152A8A6E0}"/>
+                <a16:creationId xmlns:a16="http://schemas.microsoft.com/office/drawing/2014/main" id="{DF4AD769-5634-43C4-B8A9-1F2152A8A6E0}"/>
               </a:ext>
             </a:extLst>
           </p:cNvPr>
@@ -5058,7 +5051,7 @@
           <p:cNvPr id="107" name="Rectangle 106">
             <a:extLst>
               <a:ext uri="{FF2B5EF4-FFF2-40B4-BE49-F238E27FC236}">
-                <a16:creationId xmlns:a16="http://schemas.microsoft.com/office/drawing/2014/main" xmlns="" id="{151BE2A7-7E63-4EFB-87E8-CED6A3BFEF9D}"/>
+                <a16:creationId xmlns:a16="http://schemas.microsoft.com/office/drawing/2014/main" id="{151BE2A7-7E63-4EFB-87E8-CED6A3BFEF9D}"/>
               </a:ext>
             </a:extLst>
           </p:cNvPr>
@@ -5133,7 +5126,7 @@
           <p:cNvPr id="109" name="Rectangle 108">
             <a:extLst>
               <a:ext uri="{FF2B5EF4-FFF2-40B4-BE49-F238E27FC236}">
-                <a16:creationId xmlns:a16="http://schemas.microsoft.com/office/drawing/2014/main" xmlns="" id="{DB8FBECC-8147-49D3-B4CF-3C03A51E2256}"/>
+                <a16:creationId xmlns:a16="http://schemas.microsoft.com/office/drawing/2014/main" id="{DB8FBECC-8147-49D3-B4CF-3C03A51E2256}"/>
               </a:ext>
             </a:extLst>
           </p:cNvPr>
@@ -5214,7 +5207,7 @@
           <p:cNvPr id="110" name="Rectangle 109">
             <a:extLst>
               <a:ext uri="{FF2B5EF4-FFF2-40B4-BE49-F238E27FC236}">
-                <a16:creationId xmlns:a16="http://schemas.microsoft.com/office/drawing/2014/main" xmlns="" id="{F89AA3C3-593A-463E-A55D-F747ED93DC79}"/>
+                <a16:creationId xmlns:a16="http://schemas.microsoft.com/office/drawing/2014/main" id="{F89AA3C3-593A-463E-A55D-F747ED93DC79}"/>
               </a:ext>
             </a:extLst>
           </p:cNvPr>
@@ -5292,7 +5285,7 @@
           <p:cNvPr id="111" name="Rectangle 110">
             <a:extLst>
               <a:ext uri="{FF2B5EF4-FFF2-40B4-BE49-F238E27FC236}">
-                <a16:creationId xmlns:a16="http://schemas.microsoft.com/office/drawing/2014/main" xmlns="" id="{F1B816D3-4234-43BF-8C04-FFB9E90C356B}"/>
+                <a16:creationId xmlns:a16="http://schemas.microsoft.com/office/drawing/2014/main" id="{F1B816D3-4234-43BF-8C04-FFB9E90C356B}"/>
               </a:ext>
             </a:extLst>
           </p:cNvPr>
@@ -5367,7 +5360,7 @@
           <p:cNvPr id="113" name="Rectangle 112">
             <a:extLst>
               <a:ext uri="{FF2B5EF4-FFF2-40B4-BE49-F238E27FC236}">
-                <a16:creationId xmlns:a16="http://schemas.microsoft.com/office/drawing/2014/main" xmlns="" id="{10170A6E-721E-4A5A-9C5C-135C6D7C943D}"/>
+                <a16:creationId xmlns:a16="http://schemas.microsoft.com/office/drawing/2014/main" id="{10170A6E-721E-4A5A-9C5C-135C6D7C943D}"/>
               </a:ext>
             </a:extLst>
           </p:cNvPr>
@@ -5448,7 +5441,7 @@
           <p:cNvPr id="114" name="Rectangle 113">
             <a:extLst>
               <a:ext uri="{FF2B5EF4-FFF2-40B4-BE49-F238E27FC236}">
-                <a16:creationId xmlns:a16="http://schemas.microsoft.com/office/drawing/2014/main" xmlns="" id="{35759107-3B41-43A2-8CBC-3492CC06A2BB}"/>
+                <a16:creationId xmlns:a16="http://schemas.microsoft.com/office/drawing/2014/main" id="{35759107-3B41-43A2-8CBC-3492CC06A2BB}"/>
               </a:ext>
             </a:extLst>
           </p:cNvPr>
@@ -5526,7 +5519,7 @@
           <p:cNvPr id="115" name="Rectangle 114">
             <a:extLst>
               <a:ext uri="{FF2B5EF4-FFF2-40B4-BE49-F238E27FC236}">
-                <a16:creationId xmlns:a16="http://schemas.microsoft.com/office/drawing/2014/main" xmlns="" id="{CFD947A2-D48A-4D7E-A82D-AC0A090783B2}"/>
+                <a16:creationId xmlns:a16="http://schemas.microsoft.com/office/drawing/2014/main" id="{CFD947A2-D48A-4D7E-A82D-AC0A090783B2}"/>
               </a:ext>
             </a:extLst>
           </p:cNvPr>
@@ -5601,7 +5594,7 @@
           <p:cNvPr id="117" name="TextBox 116">
             <a:extLst>
               <a:ext uri="{FF2B5EF4-FFF2-40B4-BE49-F238E27FC236}">
-                <a16:creationId xmlns:a16="http://schemas.microsoft.com/office/drawing/2014/main" xmlns="" id="{8F49857B-89A4-4B41-9957-96638A83A5F8}"/>
+                <a16:creationId xmlns:a16="http://schemas.microsoft.com/office/drawing/2014/main" id="{8F49857B-89A4-4B41-9957-96638A83A5F8}"/>
               </a:ext>
             </a:extLst>
           </p:cNvPr>
@@ -5666,7 +5659,7 @@
           <p:cNvPr id="118" name="TextBox 117">
             <a:extLst>
               <a:ext uri="{FF2B5EF4-FFF2-40B4-BE49-F238E27FC236}">
-                <a16:creationId xmlns:a16="http://schemas.microsoft.com/office/drawing/2014/main" xmlns="" id="{41F30B55-69C6-4430-9321-22750EEE21C4}"/>
+                <a16:creationId xmlns:a16="http://schemas.microsoft.com/office/drawing/2014/main" id="{41F30B55-69C6-4430-9321-22750EEE21C4}"/>
               </a:ext>
             </a:extLst>
           </p:cNvPr>
@@ -5731,7 +5724,7 @@
           <p:cNvPr id="119" name="TextBox 118">
             <a:extLst>
               <a:ext uri="{FF2B5EF4-FFF2-40B4-BE49-F238E27FC236}">
-                <a16:creationId xmlns:a16="http://schemas.microsoft.com/office/drawing/2014/main" xmlns="" id="{019D0B16-9910-4D05-99DB-1C13A32220D6}"/>
+                <a16:creationId xmlns:a16="http://schemas.microsoft.com/office/drawing/2014/main" id="{019D0B16-9910-4D05-99DB-1C13A32220D6}"/>
               </a:ext>
             </a:extLst>
           </p:cNvPr>
@@ -5796,7 +5789,7 @@
           <p:cNvPr id="103" name="TextBox 102">
             <a:extLst>
               <a:ext uri="{FF2B5EF4-FFF2-40B4-BE49-F238E27FC236}">
-                <a16:creationId xmlns:a16="http://schemas.microsoft.com/office/drawing/2014/main" xmlns="" id="{620EA50D-3069-4E9C-8FFC-BC546E3A15F4}"/>
+                <a16:creationId xmlns:a16="http://schemas.microsoft.com/office/drawing/2014/main" id="{620EA50D-3069-4E9C-8FFC-BC546E3A15F4}"/>
               </a:ext>
             </a:extLst>
           </p:cNvPr>
@@ -5861,7 +5854,7 @@
           <p:cNvPr id="255" name="Title 1">
             <a:extLst>
               <a:ext uri="{FF2B5EF4-FFF2-40B4-BE49-F238E27FC236}">
-                <a16:creationId xmlns:a16="http://schemas.microsoft.com/office/drawing/2014/main" xmlns="" id="{B54C3232-AE34-455E-BD45-D58574BAEE43}"/>
+                <a16:creationId xmlns:a16="http://schemas.microsoft.com/office/drawing/2014/main" id="{B54C3232-AE34-455E-BD45-D58574BAEE43}"/>
               </a:ext>
             </a:extLst>
           </p:cNvPr>
@@ -5971,7 +5964,7 @@
           <p:cNvPr id="28" name="TextBox 27">
             <a:extLst>
               <a:ext uri="{FF2B5EF4-FFF2-40B4-BE49-F238E27FC236}">
-                <a16:creationId xmlns:a16="http://schemas.microsoft.com/office/drawing/2014/main" xmlns="" id="{ABC0D35F-21FF-41B3-8BA8-549841DEA239}"/>
+                <a16:creationId xmlns:a16="http://schemas.microsoft.com/office/drawing/2014/main" id="{ABC0D35F-21FF-41B3-8BA8-549841DEA239}"/>
               </a:ext>
             </a:extLst>
           </p:cNvPr>
@@ -6059,7 +6052,7 @@
           <p:cNvPr id="69" name="TextBox 68">
             <a:extLst>
               <a:ext uri="{FF2B5EF4-FFF2-40B4-BE49-F238E27FC236}">
-                <a16:creationId xmlns:a16="http://schemas.microsoft.com/office/drawing/2014/main" xmlns="" id="{0F8DE013-FC2F-46F4-A9E2-7DAC2B41B1DB}"/>
+                <a16:creationId xmlns:a16="http://schemas.microsoft.com/office/drawing/2014/main" id="{0F8DE013-FC2F-46F4-A9E2-7DAC2B41B1DB}"/>
               </a:ext>
             </a:extLst>
           </p:cNvPr>
@@ -6147,7 +6140,7 @@
           <p:cNvPr id="70" name="TextBox 69">
             <a:extLst>
               <a:ext uri="{FF2B5EF4-FFF2-40B4-BE49-F238E27FC236}">
-                <a16:creationId xmlns:a16="http://schemas.microsoft.com/office/drawing/2014/main" xmlns="" id="{B02A9313-CEA0-4760-8047-9EDA3B3378F0}"/>
+                <a16:creationId xmlns:a16="http://schemas.microsoft.com/office/drawing/2014/main" id="{B02A9313-CEA0-4760-8047-9EDA3B3378F0}"/>
               </a:ext>
             </a:extLst>
           </p:cNvPr>
@@ -6235,7 +6228,7 @@
           <p:cNvPr id="51" name="TextBox 50">
             <a:extLst>
               <a:ext uri="{FF2B5EF4-FFF2-40B4-BE49-F238E27FC236}">
-                <a16:creationId xmlns:a16="http://schemas.microsoft.com/office/drawing/2014/main" xmlns="" id="{785603D4-D114-4265-90D5-5656F4A54BAF}"/>
+                <a16:creationId xmlns:a16="http://schemas.microsoft.com/office/drawing/2014/main" id="{785603D4-D114-4265-90D5-5656F4A54BAF}"/>
               </a:ext>
             </a:extLst>
           </p:cNvPr>
@@ -6300,7 +6293,7 @@
           <p:cNvPr id="52" name="TextBox 51">
             <a:extLst>
               <a:ext uri="{FF2B5EF4-FFF2-40B4-BE49-F238E27FC236}">
-                <a16:creationId xmlns:a16="http://schemas.microsoft.com/office/drawing/2014/main" xmlns="" id="{F5A155B5-9046-4346-8D94-C2B8383AE704}"/>
+                <a16:creationId xmlns:a16="http://schemas.microsoft.com/office/drawing/2014/main" id="{F5A155B5-9046-4346-8D94-C2B8383AE704}"/>
               </a:ext>
             </a:extLst>
           </p:cNvPr>
@@ -6365,7 +6358,7 @@
           <p:cNvPr id="53" name="Rectangle 52">
             <a:extLst>
               <a:ext uri="{FF2B5EF4-FFF2-40B4-BE49-F238E27FC236}">
-                <a16:creationId xmlns:a16="http://schemas.microsoft.com/office/drawing/2014/main" xmlns="" id="{ECC657B7-9991-41D5-A7F3-D0D0ACB04604}"/>
+                <a16:creationId xmlns:a16="http://schemas.microsoft.com/office/drawing/2014/main" id="{ECC657B7-9991-41D5-A7F3-D0D0ACB04604}"/>
               </a:ext>
             </a:extLst>
           </p:cNvPr>
@@ -6446,7 +6439,7 @@
           <p:cNvPr id="54" name="Rectangle 53">
             <a:extLst>
               <a:ext uri="{FF2B5EF4-FFF2-40B4-BE49-F238E27FC236}">
-                <a16:creationId xmlns:a16="http://schemas.microsoft.com/office/drawing/2014/main" xmlns="" id="{48007224-3ACD-46B6-B58B-795D14312382}"/>
+                <a16:creationId xmlns:a16="http://schemas.microsoft.com/office/drawing/2014/main" id="{48007224-3ACD-46B6-B58B-795D14312382}"/>
               </a:ext>
             </a:extLst>
           </p:cNvPr>
@@ -6500,7 +6493,7 @@
           <p:cNvPr id="55" name="Rectangle 54">
             <a:extLst>
               <a:ext uri="{FF2B5EF4-FFF2-40B4-BE49-F238E27FC236}">
-                <a16:creationId xmlns:a16="http://schemas.microsoft.com/office/drawing/2014/main" xmlns="" id="{213EC90E-12C6-4A58-BAC3-C1904AE8D31D}"/>
+                <a16:creationId xmlns:a16="http://schemas.microsoft.com/office/drawing/2014/main" id="{213EC90E-12C6-4A58-BAC3-C1904AE8D31D}"/>
               </a:ext>
             </a:extLst>
           </p:cNvPr>
@@ -6586,7 +6579,7 @@
           <p:cNvPr id="56" name="Rectangle 55">
             <a:extLst>
               <a:ext uri="{FF2B5EF4-FFF2-40B4-BE49-F238E27FC236}">
-                <a16:creationId xmlns:a16="http://schemas.microsoft.com/office/drawing/2014/main" xmlns="" id="{784FC545-C41E-41F4-BF2E-521B5A1D7663}"/>
+                <a16:creationId xmlns:a16="http://schemas.microsoft.com/office/drawing/2014/main" id="{784FC545-C41E-41F4-BF2E-521B5A1D7663}"/>
               </a:ext>
             </a:extLst>
           </p:cNvPr>
@@ -6661,7 +6654,7 @@
           <p:cNvPr id="57" name="Rectangle 56">
             <a:extLst>
               <a:ext uri="{FF2B5EF4-FFF2-40B4-BE49-F238E27FC236}">
-                <a16:creationId xmlns:a16="http://schemas.microsoft.com/office/drawing/2014/main" xmlns="" id="{1A10751C-6EE9-476E-9147-080137AC3182}"/>
+                <a16:creationId xmlns:a16="http://schemas.microsoft.com/office/drawing/2014/main" id="{1A10751C-6EE9-476E-9147-080137AC3182}"/>
               </a:ext>
             </a:extLst>
           </p:cNvPr>
@@ -6739,7 +6732,7 @@
           <p:cNvPr id="58" name="Rectangle 57">
             <a:extLst>
               <a:ext uri="{FF2B5EF4-FFF2-40B4-BE49-F238E27FC236}">
-                <a16:creationId xmlns:a16="http://schemas.microsoft.com/office/drawing/2014/main" xmlns="" id="{6F7B5DBF-35C4-478D-8A9A-866865D9FA90}"/>
+                <a16:creationId xmlns:a16="http://schemas.microsoft.com/office/drawing/2014/main" id="{6F7B5DBF-35C4-478D-8A9A-866865D9FA90}"/>
               </a:ext>
             </a:extLst>
           </p:cNvPr>
@@ -6825,7 +6818,7 @@
           <p:cNvPr id="59" name="Rectangle 58">
             <a:extLst>
               <a:ext uri="{FF2B5EF4-FFF2-40B4-BE49-F238E27FC236}">
-                <a16:creationId xmlns:a16="http://schemas.microsoft.com/office/drawing/2014/main" xmlns="" id="{F549DFF7-F2C7-45BF-AD9F-296AA876500C}"/>
+                <a16:creationId xmlns:a16="http://schemas.microsoft.com/office/drawing/2014/main" id="{F549DFF7-F2C7-45BF-AD9F-296AA876500C}"/>
               </a:ext>
             </a:extLst>
           </p:cNvPr>
@@ -6882,7 +6875,7 @@
           <p:cNvPr id="60" name="Rectangle 59">
             <a:extLst>
               <a:ext uri="{FF2B5EF4-FFF2-40B4-BE49-F238E27FC236}">
-                <a16:creationId xmlns:a16="http://schemas.microsoft.com/office/drawing/2014/main" xmlns="" id="{5E04C732-92DE-417C-B3AC-5B00FADC0B88}"/>
+                <a16:creationId xmlns:a16="http://schemas.microsoft.com/office/drawing/2014/main" id="{5E04C732-92DE-417C-B3AC-5B00FADC0B88}"/>
               </a:ext>
             </a:extLst>
           </p:cNvPr>
@@ -6936,7 +6929,7 @@
           <p:cNvPr id="61" name="Rectangle 60">
             <a:extLst>
               <a:ext uri="{FF2B5EF4-FFF2-40B4-BE49-F238E27FC236}">
-                <a16:creationId xmlns:a16="http://schemas.microsoft.com/office/drawing/2014/main" xmlns="" id="{67CC3697-2CC5-4C36-9D21-CC3CB353ACC5}"/>
+                <a16:creationId xmlns:a16="http://schemas.microsoft.com/office/drawing/2014/main" id="{67CC3697-2CC5-4C36-9D21-CC3CB353ACC5}"/>
               </a:ext>
             </a:extLst>
           </p:cNvPr>
@@ -7022,7 +7015,7 @@
           <p:cNvPr id="62" name="TextBox 61">
             <a:extLst>
               <a:ext uri="{FF2B5EF4-FFF2-40B4-BE49-F238E27FC236}">
-                <a16:creationId xmlns:a16="http://schemas.microsoft.com/office/drawing/2014/main" xmlns="" id="{61A1DF43-82D3-40BB-BC09-D7E751104E69}"/>
+                <a16:creationId xmlns:a16="http://schemas.microsoft.com/office/drawing/2014/main" id="{61A1DF43-82D3-40BB-BC09-D7E751104E69}"/>
               </a:ext>
             </a:extLst>
           </p:cNvPr>
@@ -7087,7 +7080,7 @@
           <p:cNvPr id="63" name="TextBox 62">
             <a:extLst>
               <a:ext uri="{FF2B5EF4-FFF2-40B4-BE49-F238E27FC236}">
-                <a16:creationId xmlns:a16="http://schemas.microsoft.com/office/drawing/2014/main" xmlns="" id="{36E6A1DD-D64B-4228-8483-D44CC24590C0}"/>
+                <a16:creationId xmlns:a16="http://schemas.microsoft.com/office/drawing/2014/main" id="{36E6A1DD-D64B-4228-8483-D44CC24590C0}"/>
               </a:ext>
             </a:extLst>
           </p:cNvPr>
@@ -7152,7 +7145,7 @@
           <p:cNvPr id="64" name="TextBox 63">
             <a:extLst>
               <a:ext uri="{FF2B5EF4-FFF2-40B4-BE49-F238E27FC236}">
-                <a16:creationId xmlns:a16="http://schemas.microsoft.com/office/drawing/2014/main" xmlns="" id="{28291056-0188-4A85-AA84-3367C5A1A6ED}"/>
+                <a16:creationId xmlns:a16="http://schemas.microsoft.com/office/drawing/2014/main" id="{28291056-0188-4A85-AA84-3367C5A1A6ED}"/>
               </a:ext>
             </a:extLst>
           </p:cNvPr>
@@ -7217,7 +7210,7 @@
           <p:cNvPr id="65" name="TextBox 64">
             <a:extLst>
               <a:ext uri="{FF2B5EF4-FFF2-40B4-BE49-F238E27FC236}">
-                <a16:creationId xmlns:a16="http://schemas.microsoft.com/office/drawing/2014/main" xmlns="" id="{9057E5E0-653D-4290-905E-6943040E2FDA}"/>
+                <a16:creationId xmlns:a16="http://schemas.microsoft.com/office/drawing/2014/main" id="{9057E5E0-653D-4290-905E-6943040E2FDA}"/>
               </a:ext>
             </a:extLst>
           </p:cNvPr>
@@ -7282,7 +7275,7 @@
           <p:cNvPr id="66" name="TextBox 65">
             <a:extLst>
               <a:ext uri="{FF2B5EF4-FFF2-40B4-BE49-F238E27FC236}">
-                <a16:creationId xmlns:a16="http://schemas.microsoft.com/office/drawing/2014/main" xmlns="" id="{AD88C6DD-E630-4F06-86C4-87FF66E11DEC}"/>
+                <a16:creationId xmlns:a16="http://schemas.microsoft.com/office/drawing/2014/main" id="{AD88C6DD-E630-4F06-86C4-87FF66E11DEC}"/>
               </a:ext>
             </a:extLst>
           </p:cNvPr>
@@ -7370,7 +7363,7 @@
           <p:cNvPr id="67" name="TextBox 66">
             <a:extLst>
               <a:ext uri="{FF2B5EF4-FFF2-40B4-BE49-F238E27FC236}">
-                <a16:creationId xmlns:a16="http://schemas.microsoft.com/office/drawing/2014/main" xmlns="" id="{F8DCB9AF-71A8-4681-BFF8-A1C29E5BD16B}"/>
+                <a16:creationId xmlns:a16="http://schemas.microsoft.com/office/drawing/2014/main" id="{F8DCB9AF-71A8-4681-BFF8-A1C29E5BD16B}"/>
               </a:ext>
             </a:extLst>
           </p:cNvPr>
@@ -7458,7 +7451,7 @@
           <p:cNvPr id="68" name="TextBox 67">
             <a:extLst>
               <a:ext uri="{FF2B5EF4-FFF2-40B4-BE49-F238E27FC236}">
-                <a16:creationId xmlns:a16="http://schemas.microsoft.com/office/drawing/2014/main" xmlns="" id="{979F8F0E-1D29-4081-951D-BFC8A79D60CE}"/>
+                <a16:creationId xmlns:a16="http://schemas.microsoft.com/office/drawing/2014/main" id="{979F8F0E-1D29-4081-951D-BFC8A79D60CE}"/>
               </a:ext>
             </a:extLst>
           </p:cNvPr>
@@ -7529,7 +7522,7 @@
           <p:cNvPr id="75" name="Rectangle 74">
             <a:extLst>
               <a:ext uri="{FF2B5EF4-FFF2-40B4-BE49-F238E27FC236}">
-                <a16:creationId xmlns:a16="http://schemas.microsoft.com/office/drawing/2014/main" xmlns="" id="{CABD2ED7-4160-4725-B37F-D713247A1290}"/>
+                <a16:creationId xmlns:a16="http://schemas.microsoft.com/office/drawing/2014/main" id="{CABD2ED7-4160-4725-B37F-D713247A1290}"/>
               </a:ext>
             </a:extLst>
           </p:cNvPr>
@@ -7604,7 +7597,7 @@
           <p:cNvPr id="76" name="Rectangle 75">
             <a:extLst>
               <a:ext uri="{FF2B5EF4-FFF2-40B4-BE49-F238E27FC236}">
-                <a16:creationId xmlns:a16="http://schemas.microsoft.com/office/drawing/2014/main" xmlns="" id="{62321179-7032-41C6-87AD-29E6D00C550F}"/>
+                <a16:creationId xmlns:a16="http://schemas.microsoft.com/office/drawing/2014/main" id="{62321179-7032-41C6-87AD-29E6D00C550F}"/>
               </a:ext>
             </a:extLst>
           </p:cNvPr>
@@ -7682,7 +7675,7 @@
           <p:cNvPr id="77" name="Rectangle 76">
             <a:extLst>
               <a:ext uri="{FF2B5EF4-FFF2-40B4-BE49-F238E27FC236}">
-                <a16:creationId xmlns:a16="http://schemas.microsoft.com/office/drawing/2014/main" xmlns="" id="{C873A4B6-80AE-4240-AC75-4CFBB156C5E8}"/>
+                <a16:creationId xmlns:a16="http://schemas.microsoft.com/office/drawing/2014/main" id="{C873A4B6-80AE-4240-AC75-4CFBB156C5E8}"/>
               </a:ext>
             </a:extLst>
           </p:cNvPr>
@@ -7757,7 +7750,7 @@
           <p:cNvPr id="78" name="Rectangle 77">
             <a:extLst>
               <a:ext uri="{FF2B5EF4-FFF2-40B4-BE49-F238E27FC236}">
-                <a16:creationId xmlns:a16="http://schemas.microsoft.com/office/drawing/2014/main" xmlns="" id="{46CB311D-28A1-48DB-B97F-676B1DBD1486}"/>
+                <a16:creationId xmlns:a16="http://schemas.microsoft.com/office/drawing/2014/main" id="{46CB311D-28A1-48DB-B97F-676B1DBD1486}"/>
               </a:ext>
             </a:extLst>
           </p:cNvPr>
@@ -7832,7 +7825,7 @@
           <p:cNvPr id="79" name="Rectangle 78">
             <a:extLst>
               <a:ext uri="{FF2B5EF4-FFF2-40B4-BE49-F238E27FC236}">
-                <a16:creationId xmlns:a16="http://schemas.microsoft.com/office/drawing/2014/main" xmlns="" id="{700458BC-9765-4A16-BF34-C68FAB018DD5}"/>
+                <a16:creationId xmlns:a16="http://schemas.microsoft.com/office/drawing/2014/main" id="{700458BC-9765-4A16-BF34-C68FAB018DD5}"/>
               </a:ext>
             </a:extLst>
           </p:cNvPr>
@@ -7910,7 +7903,7 @@
           <p:cNvPr id="80" name="Rectangle 79">
             <a:extLst>
               <a:ext uri="{FF2B5EF4-FFF2-40B4-BE49-F238E27FC236}">
-                <a16:creationId xmlns:a16="http://schemas.microsoft.com/office/drawing/2014/main" xmlns="" id="{33AE22B5-B44A-45A2-BEF3-8AB63D6A516A}"/>
+                <a16:creationId xmlns:a16="http://schemas.microsoft.com/office/drawing/2014/main" id="{33AE22B5-B44A-45A2-BEF3-8AB63D6A516A}"/>
               </a:ext>
             </a:extLst>
           </p:cNvPr>
@@ -7996,7 +7989,7 @@
           <p:cNvPr id="81" name="Rectangle 80">
             <a:extLst>
               <a:ext uri="{FF2B5EF4-FFF2-40B4-BE49-F238E27FC236}">
-                <a16:creationId xmlns:a16="http://schemas.microsoft.com/office/drawing/2014/main" xmlns="" id="{6030E46E-C4C6-4F30-A08F-D1693581E612}"/>
+                <a16:creationId xmlns:a16="http://schemas.microsoft.com/office/drawing/2014/main" id="{6030E46E-C4C6-4F30-A08F-D1693581E612}"/>
               </a:ext>
             </a:extLst>
           </p:cNvPr>
@@ -8053,7 +8046,7 @@
           <p:cNvPr id="82" name="Rectangle 81">
             <a:extLst>
               <a:ext uri="{FF2B5EF4-FFF2-40B4-BE49-F238E27FC236}">
-                <a16:creationId xmlns:a16="http://schemas.microsoft.com/office/drawing/2014/main" xmlns="" id="{731D07D4-038D-41EE-855A-A0E15F7B95E4}"/>
+                <a16:creationId xmlns:a16="http://schemas.microsoft.com/office/drawing/2014/main" id="{731D07D4-038D-41EE-855A-A0E15F7B95E4}"/>
               </a:ext>
             </a:extLst>
           </p:cNvPr>
@@ -8107,7 +8100,7 @@
           <p:cNvPr id="83" name="Rectangle 82">
             <a:extLst>
               <a:ext uri="{FF2B5EF4-FFF2-40B4-BE49-F238E27FC236}">
-                <a16:creationId xmlns:a16="http://schemas.microsoft.com/office/drawing/2014/main" xmlns="" id="{2C003A59-92D9-4F83-AE81-9EA2519A586E}"/>
+                <a16:creationId xmlns:a16="http://schemas.microsoft.com/office/drawing/2014/main" id="{2C003A59-92D9-4F83-AE81-9EA2519A586E}"/>
               </a:ext>
             </a:extLst>
           </p:cNvPr>
@@ -8193,7 +8186,7 @@
           <p:cNvPr id="84" name="Rectangle 83">
             <a:extLst>
               <a:ext uri="{FF2B5EF4-FFF2-40B4-BE49-F238E27FC236}">
-                <a16:creationId xmlns:a16="http://schemas.microsoft.com/office/drawing/2014/main" xmlns="" id="{49BEC1AB-C617-4EBE-A840-42DFD12B8A7A}"/>
+                <a16:creationId xmlns:a16="http://schemas.microsoft.com/office/drawing/2014/main" id="{49BEC1AB-C617-4EBE-A840-42DFD12B8A7A}"/>
               </a:ext>
             </a:extLst>
           </p:cNvPr>
@@ -8274,7 +8267,7 @@
           <p:cNvPr id="85" name="Rectangle 84">
             <a:extLst>
               <a:ext uri="{FF2B5EF4-FFF2-40B4-BE49-F238E27FC236}">
-                <a16:creationId xmlns:a16="http://schemas.microsoft.com/office/drawing/2014/main" xmlns="" id="{8EE97DD9-CD5A-4BC1-9BE6-E1E6BD56DFF2}"/>
+                <a16:creationId xmlns:a16="http://schemas.microsoft.com/office/drawing/2014/main" id="{8EE97DD9-CD5A-4BC1-9BE6-E1E6BD56DFF2}"/>
               </a:ext>
             </a:extLst>
           </p:cNvPr>
@@ -8328,7 +8321,7 @@
           <p:cNvPr id="86" name="Rectangle 85">
             <a:extLst>
               <a:ext uri="{FF2B5EF4-FFF2-40B4-BE49-F238E27FC236}">
-                <a16:creationId xmlns:a16="http://schemas.microsoft.com/office/drawing/2014/main" xmlns="" id="{7C5ED532-1A25-4B26-978C-7082CA343F14}"/>
+                <a16:creationId xmlns:a16="http://schemas.microsoft.com/office/drawing/2014/main" id="{7C5ED532-1A25-4B26-978C-7082CA343F14}"/>
               </a:ext>
             </a:extLst>
           </p:cNvPr>
@@ -8414,7 +8407,7 @@
           <p:cNvPr id="87" name="Rectangle 86">
             <a:extLst>
               <a:ext uri="{FF2B5EF4-FFF2-40B4-BE49-F238E27FC236}">
-                <a16:creationId xmlns:a16="http://schemas.microsoft.com/office/drawing/2014/main" xmlns="" id="{6AC5FACA-FC4F-483F-B914-FF9CE6B21573}"/>
+                <a16:creationId xmlns:a16="http://schemas.microsoft.com/office/drawing/2014/main" id="{6AC5FACA-FC4F-483F-B914-FF9CE6B21573}"/>
               </a:ext>
             </a:extLst>
           </p:cNvPr>
@@ -8495,7 +8488,7 @@
           <p:cNvPr id="88" name="Rectangle 87">
             <a:extLst>
               <a:ext uri="{FF2B5EF4-FFF2-40B4-BE49-F238E27FC236}">
-                <a16:creationId xmlns:a16="http://schemas.microsoft.com/office/drawing/2014/main" xmlns="" id="{F47A1061-0D9F-4EDE-B6EF-DE3EA2C96A22}"/>
+                <a16:creationId xmlns:a16="http://schemas.microsoft.com/office/drawing/2014/main" id="{F47A1061-0D9F-4EDE-B6EF-DE3EA2C96A22}"/>
               </a:ext>
             </a:extLst>
           </p:cNvPr>
@@ -8573,7 +8566,7 @@
           <p:cNvPr id="89" name="Rectangle 88">
             <a:extLst>
               <a:ext uri="{FF2B5EF4-FFF2-40B4-BE49-F238E27FC236}">
-                <a16:creationId xmlns:a16="http://schemas.microsoft.com/office/drawing/2014/main" xmlns="" id="{8D6AB86D-21B0-42F8-98EC-C062E979E8C8}"/>
+                <a16:creationId xmlns:a16="http://schemas.microsoft.com/office/drawing/2014/main" id="{8D6AB86D-21B0-42F8-98EC-C062E979E8C8}"/>
               </a:ext>
             </a:extLst>
           </p:cNvPr>
@@ -8648,7 +8641,7 @@
           <p:cNvPr id="90" name="Rectangle 89">
             <a:extLst>
               <a:ext uri="{FF2B5EF4-FFF2-40B4-BE49-F238E27FC236}">
-                <a16:creationId xmlns:a16="http://schemas.microsoft.com/office/drawing/2014/main" xmlns="" id="{2FD93EAC-A80B-4185-B9CF-77E7B18AD121}"/>
+                <a16:creationId xmlns:a16="http://schemas.microsoft.com/office/drawing/2014/main" id="{2FD93EAC-A80B-4185-B9CF-77E7B18AD121}"/>
               </a:ext>
             </a:extLst>
           </p:cNvPr>
@@ -8729,7 +8722,7 @@
           <p:cNvPr id="91" name="Rectangle 90">
             <a:extLst>
               <a:ext uri="{FF2B5EF4-FFF2-40B4-BE49-F238E27FC236}">
-                <a16:creationId xmlns:a16="http://schemas.microsoft.com/office/drawing/2014/main" xmlns="" id="{370C3AB2-42D8-4824-8075-629485572256}"/>
+                <a16:creationId xmlns:a16="http://schemas.microsoft.com/office/drawing/2014/main" id="{370C3AB2-42D8-4824-8075-629485572256}"/>
               </a:ext>
             </a:extLst>
           </p:cNvPr>
@@ -8807,7 +8800,7 @@
           <p:cNvPr id="92" name="Rectangle 91">
             <a:extLst>
               <a:ext uri="{FF2B5EF4-FFF2-40B4-BE49-F238E27FC236}">
-                <a16:creationId xmlns:a16="http://schemas.microsoft.com/office/drawing/2014/main" xmlns="" id="{5F3B901A-EC58-41BE-8FED-5369529C33C0}"/>
+                <a16:creationId xmlns:a16="http://schemas.microsoft.com/office/drawing/2014/main" id="{5F3B901A-EC58-41BE-8FED-5369529C33C0}"/>
               </a:ext>
             </a:extLst>
           </p:cNvPr>
@@ -8882,7 +8875,7 @@
           <p:cNvPr id="5" name="Straight Arrow Connector 4">
             <a:extLst>
               <a:ext uri="{FF2B5EF4-FFF2-40B4-BE49-F238E27FC236}">
-                <a16:creationId xmlns:a16="http://schemas.microsoft.com/office/drawing/2014/main" xmlns="" id="{EA8623CE-9957-460A-8725-7BD2071C585A}"/>
+                <a16:creationId xmlns:a16="http://schemas.microsoft.com/office/drawing/2014/main" id="{EA8623CE-9957-460A-8725-7BD2071C585A}"/>
               </a:ext>
             </a:extLst>
           </p:cNvPr>
@@ -8921,7 +8914,7 @@
           <p:cNvPr id="93" name="Straight Arrow Connector 92">
             <a:extLst>
               <a:ext uri="{FF2B5EF4-FFF2-40B4-BE49-F238E27FC236}">
-                <a16:creationId xmlns:a16="http://schemas.microsoft.com/office/drawing/2014/main" xmlns="" id="{51186656-C9C2-4367-B426-A3281BF0AC77}"/>
+                <a16:creationId xmlns:a16="http://schemas.microsoft.com/office/drawing/2014/main" id="{51186656-C9C2-4367-B426-A3281BF0AC77}"/>
               </a:ext>
             </a:extLst>
           </p:cNvPr>
@@ -8962,7 +8955,7 @@
           <p:cNvPr id="94" name="Straight Arrow Connector 93">
             <a:extLst>
               <a:ext uri="{FF2B5EF4-FFF2-40B4-BE49-F238E27FC236}">
-                <a16:creationId xmlns:a16="http://schemas.microsoft.com/office/drawing/2014/main" xmlns="" id="{04688AD6-462C-4DA1-B75F-AE787F97350B}"/>
+                <a16:creationId xmlns:a16="http://schemas.microsoft.com/office/drawing/2014/main" id="{04688AD6-462C-4DA1-B75F-AE787F97350B}"/>
               </a:ext>
             </a:extLst>
           </p:cNvPr>
@@ -9003,7 +8996,7 @@
           <p:cNvPr id="10" name="TextBox 9">
             <a:extLst>
               <a:ext uri="{FF2B5EF4-FFF2-40B4-BE49-F238E27FC236}">
-                <a16:creationId xmlns:a16="http://schemas.microsoft.com/office/drawing/2014/main" xmlns="" id="{7EE1FA8B-DD4F-4F27-AA65-B353605899D6}"/>
+                <a16:creationId xmlns:a16="http://schemas.microsoft.com/office/drawing/2014/main" id="{7EE1FA8B-DD4F-4F27-AA65-B353605899D6}"/>
               </a:ext>
             </a:extLst>
           </p:cNvPr>
@@ -9109,7 +9102,7 @@
           <p:cNvPr id="128" name="Rectangle 127">
             <a:extLst>
               <a:ext uri="{FF2B5EF4-FFF2-40B4-BE49-F238E27FC236}">
-                <a16:creationId xmlns:a16="http://schemas.microsoft.com/office/drawing/2014/main" xmlns="" id="{4D12D379-0C80-4725-8A9D-566A576F12E1}"/>
+                <a16:creationId xmlns:a16="http://schemas.microsoft.com/office/drawing/2014/main" id="{4D12D379-0C80-4725-8A9D-566A576F12E1}"/>
               </a:ext>
             </a:extLst>
           </p:cNvPr>
@@ -9184,7 +9177,7 @@
           <p:cNvPr id="129" name="Rectangle 128">
             <a:extLst>
               <a:ext uri="{FF2B5EF4-FFF2-40B4-BE49-F238E27FC236}">
-                <a16:creationId xmlns:a16="http://schemas.microsoft.com/office/drawing/2014/main" xmlns="" id="{8966476F-B093-4614-AD71-2C5F7A44B967}"/>
+                <a16:creationId xmlns:a16="http://schemas.microsoft.com/office/drawing/2014/main" id="{8966476F-B093-4614-AD71-2C5F7A44B967}"/>
               </a:ext>
             </a:extLst>
           </p:cNvPr>
@@ -9262,7 +9255,7 @@
           <p:cNvPr id="130" name="Rectangle 129">
             <a:extLst>
               <a:ext uri="{FF2B5EF4-FFF2-40B4-BE49-F238E27FC236}">
-                <a16:creationId xmlns:a16="http://schemas.microsoft.com/office/drawing/2014/main" xmlns="" id="{231EDF64-9089-4A2F-A24A-8CA33AC3294B}"/>
+                <a16:creationId xmlns:a16="http://schemas.microsoft.com/office/drawing/2014/main" id="{231EDF64-9089-4A2F-A24A-8CA33AC3294B}"/>
               </a:ext>
             </a:extLst>
           </p:cNvPr>
@@ -9337,7 +9330,7 @@
           <p:cNvPr id="131" name="Rectangle 130">
             <a:extLst>
               <a:ext uri="{FF2B5EF4-FFF2-40B4-BE49-F238E27FC236}">
-                <a16:creationId xmlns:a16="http://schemas.microsoft.com/office/drawing/2014/main" xmlns="" id="{28115567-EDBE-411D-B50D-3CD2B76516B0}"/>
+                <a16:creationId xmlns:a16="http://schemas.microsoft.com/office/drawing/2014/main" id="{28115567-EDBE-411D-B50D-3CD2B76516B0}"/>
               </a:ext>
             </a:extLst>
           </p:cNvPr>
@@ -9418,7 +9411,7 @@
           <p:cNvPr id="132" name="Rectangle 131">
             <a:extLst>
               <a:ext uri="{FF2B5EF4-FFF2-40B4-BE49-F238E27FC236}">
-                <a16:creationId xmlns:a16="http://schemas.microsoft.com/office/drawing/2014/main" xmlns="" id="{D8DB4043-76A7-4F12-A22B-4399ADEC0E74}"/>
+                <a16:creationId xmlns:a16="http://schemas.microsoft.com/office/drawing/2014/main" id="{D8DB4043-76A7-4F12-A22B-4399ADEC0E74}"/>
               </a:ext>
             </a:extLst>
           </p:cNvPr>
@@ -9496,7 +9489,7 @@
           <p:cNvPr id="133" name="Rectangle 132">
             <a:extLst>
               <a:ext uri="{FF2B5EF4-FFF2-40B4-BE49-F238E27FC236}">
-                <a16:creationId xmlns:a16="http://schemas.microsoft.com/office/drawing/2014/main" xmlns="" id="{26ACEDC7-7B37-4D8D-80C6-30F59485C7A1}"/>
+                <a16:creationId xmlns:a16="http://schemas.microsoft.com/office/drawing/2014/main" id="{26ACEDC7-7B37-4D8D-80C6-30F59485C7A1}"/>
               </a:ext>
             </a:extLst>
           </p:cNvPr>
@@ -9571,7 +9564,7 @@
           <p:cNvPr id="134" name="Rectangle 133">
             <a:extLst>
               <a:ext uri="{FF2B5EF4-FFF2-40B4-BE49-F238E27FC236}">
-                <a16:creationId xmlns:a16="http://schemas.microsoft.com/office/drawing/2014/main" xmlns="" id="{1C90FE7A-ABFB-44FB-B6B8-A7FD50C93A83}"/>
+                <a16:creationId xmlns:a16="http://schemas.microsoft.com/office/drawing/2014/main" id="{1C90FE7A-ABFB-44FB-B6B8-A7FD50C93A83}"/>
               </a:ext>
             </a:extLst>
           </p:cNvPr>
@@ -9652,7 +9645,7 @@
           <p:cNvPr id="135" name="Rectangle 134">
             <a:extLst>
               <a:ext uri="{FF2B5EF4-FFF2-40B4-BE49-F238E27FC236}">
-                <a16:creationId xmlns:a16="http://schemas.microsoft.com/office/drawing/2014/main" xmlns="" id="{E1F9B3A6-EAF2-413F-A20A-ABA77E76B46D}"/>
+                <a16:creationId xmlns:a16="http://schemas.microsoft.com/office/drawing/2014/main" id="{E1F9B3A6-EAF2-413F-A20A-ABA77E76B46D}"/>
               </a:ext>
             </a:extLst>
           </p:cNvPr>
@@ -9730,7 +9723,7 @@
           <p:cNvPr id="136" name="Rectangle 135">
             <a:extLst>
               <a:ext uri="{FF2B5EF4-FFF2-40B4-BE49-F238E27FC236}">
-                <a16:creationId xmlns:a16="http://schemas.microsoft.com/office/drawing/2014/main" xmlns="" id="{9B21AE7B-F7EA-4C33-B1E8-6DC3056B115D}"/>
+                <a16:creationId xmlns:a16="http://schemas.microsoft.com/office/drawing/2014/main" id="{9B21AE7B-F7EA-4C33-B1E8-6DC3056B115D}"/>
               </a:ext>
             </a:extLst>
           </p:cNvPr>
@@ -9805,7 +9798,7 @@
           <p:cNvPr id="137" name="Rectangle 136">
             <a:extLst>
               <a:ext uri="{FF2B5EF4-FFF2-40B4-BE49-F238E27FC236}">
-                <a16:creationId xmlns:a16="http://schemas.microsoft.com/office/drawing/2014/main" xmlns="" id="{61D03952-6BA9-4D9D-AC58-E896020EFFC6}"/>
+                <a16:creationId xmlns:a16="http://schemas.microsoft.com/office/drawing/2014/main" id="{61D03952-6BA9-4D9D-AC58-E896020EFFC6}"/>
               </a:ext>
             </a:extLst>
           </p:cNvPr>
@@ -9891,7 +9884,7 @@
           <p:cNvPr id="138" name="Rectangle 137">
             <a:extLst>
               <a:ext uri="{FF2B5EF4-FFF2-40B4-BE49-F238E27FC236}">
-                <a16:creationId xmlns:a16="http://schemas.microsoft.com/office/drawing/2014/main" xmlns="" id="{FDEF223F-5D75-469A-94A1-C4E6533BD1F5}"/>
+                <a16:creationId xmlns:a16="http://schemas.microsoft.com/office/drawing/2014/main" id="{FDEF223F-5D75-469A-94A1-C4E6533BD1F5}"/>
               </a:ext>
             </a:extLst>
           </p:cNvPr>
@@ -9977,7 +9970,7 @@
           <p:cNvPr id="139" name="Rectangle 138">
             <a:extLst>
               <a:ext uri="{FF2B5EF4-FFF2-40B4-BE49-F238E27FC236}">
-                <a16:creationId xmlns:a16="http://schemas.microsoft.com/office/drawing/2014/main" xmlns="" id="{96B3360D-5AAC-4571-B314-6F17378DE3C0}"/>
+                <a16:creationId xmlns:a16="http://schemas.microsoft.com/office/drawing/2014/main" id="{96B3360D-5AAC-4571-B314-6F17378DE3C0}"/>
               </a:ext>
             </a:extLst>
           </p:cNvPr>
@@ -10063,7 +10056,7 @@
           <p:cNvPr id="140" name="TextBox 139">
             <a:extLst>
               <a:ext uri="{FF2B5EF4-FFF2-40B4-BE49-F238E27FC236}">
-                <a16:creationId xmlns:a16="http://schemas.microsoft.com/office/drawing/2014/main" xmlns="" id="{4D402957-B0DF-4DD4-936F-DE366FC494E6}"/>
+                <a16:creationId xmlns:a16="http://schemas.microsoft.com/office/drawing/2014/main" id="{4D402957-B0DF-4DD4-936F-DE366FC494E6}"/>
               </a:ext>
             </a:extLst>
           </p:cNvPr>
@@ -10151,7 +10144,7 @@
           <p:cNvPr id="141" name="TextBox 140">
             <a:extLst>
               <a:ext uri="{FF2B5EF4-FFF2-40B4-BE49-F238E27FC236}">
-                <a16:creationId xmlns:a16="http://schemas.microsoft.com/office/drawing/2014/main" xmlns="" id="{C7524BB1-4EC3-45F1-AFC7-2B010F62CCFC}"/>
+                <a16:creationId xmlns:a16="http://schemas.microsoft.com/office/drawing/2014/main" id="{C7524BB1-4EC3-45F1-AFC7-2B010F62CCFC}"/>
               </a:ext>
             </a:extLst>
           </p:cNvPr>
@@ -10239,7 +10232,7 @@
           <p:cNvPr id="142" name="TextBox 141">
             <a:extLst>
               <a:ext uri="{FF2B5EF4-FFF2-40B4-BE49-F238E27FC236}">
-                <a16:creationId xmlns:a16="http://schemas.microsoft.com/office/drawing/2014/main" xmlns="" id="{961B7682-C456-4D0C-A7DB-DC41D01C60D6}"/>
+                <a16:creationId xmlns:a16="http://schemas.microsoft.com/office/drawing/2014/main" id="{961B7682-C456-4D0C-A7DB-DC41D01C60D6}"/>
               </a:ext>
             </a:extLst>
           </p:cNvPr>
@@ -10310,7 +10303,7 @@
           <p:cNvPr id="143" name="TextBox 142">
             <a:extLst>
               <a:ext uri="{FF2B5EF4-FFF2-40B4-BE49-F238E27FC236}">
-                <a16:creationId xmlns:a16="http://schemas.microsoft.com/office/drawing/2014/main" xmlns="" id="{4453B14D-6EB1-4866-BE89-F75A7633DD19}"/>
+                <a16:creationId xmlns:a16="http://schemas.microsoft.com/office/drawing/2014/main" id="{4453B14D-6EB1-4866-BE89-F75A7633DD19}"/>
               </a:ext>
             </a:extLst>
           </p:cNvPr>
@@ -10398,7 +10391,7 @@
           <p:cNvPr id="11" name="TextBox 10">
             <a:extLst>
               <a:ext uri="{FF2B5EF4-FFF2-40B4-BE49-F238E27FC236}">
-                <a16:creationId xmlns:a16="http://schemas.microsoft.com/office/drawing/2014/main" xmlns="" id="{1AC35287-F8AC-44FD-969C-1E19E338840C}"/>
+                <a16:creationId xmlns:a16="http://schemas.microsoft.com/office/drawing/2014/main" id="{1AC35287-F8AC-44FD-969C-1E19E338840C}"/>
               </a:ext>
             </a:extLst>
           </p:cNvPr>
@@ -10433,7 +10426,7 @@
           <p:cNvPr id="144" name="TextBox 143">
             <a:extLst>
               <a:ext uri="{FF2B5EF4-FFF2-40B4-BE49-F238E27FC236}">
-                <a16:creationId xmlns:a16="http://schemas.microsoft.com/office/drawing/2014/main" xmlns="" id="{62F98CD0-53C6-42A9-AAB7-F52F23FCCB35}"/>
+                <a16:creationId xmlns:a16="http://schemas.microsoft.com/office/drawing/2014/main" id="{62F98CD0-53C6-42A9-AAB7-F52F23FCCB35}"/>
               </a:ext>
             </a:extLst>
           </p:cNvPr>
@@ -10476,7 +10469,7 @@
   <p:timing>
     <p:tnLst>
       <p:par>
-        <p:cTn xmlns:p14="http://schemas.microsoft.com/office/powerpoint/2010/main" id="1" dur="indefinite" restart="never" nodeType="tmRoot">
+        <p:cTn id="1" dur="indefinite" restart="never" nodeType="tmRoot">
           <p:childTnLst>
             <p:seq concurrent="1" nextAc="seek">
               <p:cTn id="2" dur="indefinite" nodeType="mainSeq">
@@ -11681,7 +11674,7 @@
           <p:cNvPr id="2" name="Title 1">
             <a:extLst>
               <a:ext uri="{FF2B5EF4-FFF2-40B4-BE49-F238E27FC236}">
-                <a16:creationId xmlns:a16="http://schemas.microsoft.com/office/drawing/2014/main" xmlns="" id="{EC84C91D-5C9A-4516-BC67-968A5870A641}"/>
+                <a16:creationId xmlns:a16="http://schemas.microsoft.com/office/drawing/2014/main" id="{EC84C91D-5C9A-4516-BC67-968A5870A641}"/>
               </a:ext>
             </a:extLst>
           </p:cNvPr>
@@ -11709,7 +11702,7 @@
           <p:cNvPr id="6" name="Text Placeholder 2">
             <a:extLst>
               <a:ext uri="{FF2B5EF4-FFF2-40B4-BE49-F238E27FC236}">
-                <a16:creationId xmlns:a16="http://schemas.microsoft.com/office/drawing/2014/main" xmlns="" id="{B2492802-8B0C-4827-9851-9AFF7EA821E8}"/>
+                <a16:creationId xmlns:a16="http://schemas.microsoft.com/office/drawing/2014/main" id="{B2492802-8B0C-4827-9851-9AFF7EA821E8}"/>
               </a:ext>
             </a:extLst>
           </p:cNvPr>
@@ -11937,7 +11930,7 @@
           <p:cNvPr id="2" name="Title 1">
             <a:extLst>
               <a:ext uri="{FF2B5EF4-FFF2-40B4-BE49-F238E27FC236}">
-                <a16:creationId xmlns:a16="http://schemas.microsoft.com/office/drawing/2014/main" xmlns="" id="{EC84C91D-5C9A-4516-BC67-968A5870A641}"/>
+                <a16:creationId xmlns:a16="http://schemas.microsoft.com/office/drawing/2014/main" id="{EC84C91D-5C9A-4516-BC67-968A5870A641}"/>
               </a:ext>
             </a:extLst>
           </p:cNvPr>
@@ -11965,7 +11958,7 @@
           <p:cNvPr id="6" name="Text Placeholder 2">
             <a:extLst>
               <a:ext uri="{FF2B5EF4-FFF2-40B4-BE49-F238E27FC236}">
-                <a16:creationId xmlns:a16="http://schemas.microsoft.com/office/drawing/2014/main" xmlns="" id="{B2492802-8B0C-4827-9851-9AFF7EA821E8}"/>
+                <a16:creationId xmlns:a16="http://schemas.microsoft.com/office/drawing/2014/main" id="{B2492802-8B0C-4827-9851-9AFF7EA821E8}"/>
               </a:ext>
             </a:extLst>
           </p:cNvPr>
@@ -12095,7 +12088,7 @@
           <p:cNvPr id="4" name="Picture 3">
             <a:extLst>
               <a:ext uri="{FF2B5EF4-FFF2-40B4-BE49-F238E27FC236}">
-                <a16:creationId xmlns:a16="http://schemas.microsoft.com/office/drawing/2014/main" xmlns="" id="{EA68B806-0ADF-41AD-94D9-D7E487164373}"/>
+                <a16:creationId xmlns:a16="http://schemas.microsoft.com/office/drawing/2014/main" id="{EA68B806-0ADF-41AD-94D9-D7E487164373}"/>
               </a:ext>
             </a:extLst>
           </p:cNvPr>
@@ -12125,7 +12118,7 @@
           <p:cNvPr id="7" name="Picture 6">
             <a:extLst>
               <a:ext uri="{FF2B5EF4-FFF2-40B4-BE49-F238E27FC236}">
-                <a16:creationId xmlns:a16="http://schemas.microsoft.com/office/drawing/2014/main" xmlns="" id="{8F620CE5-8360-4B65-82A3-E1230490F84D}"/>
+                <a16:creationId xmlns:a16="http://schemas.microsoft.com/office/drawing/2014/main" id="{8F620CE5-8360-4B65-82A3-E1230490F84D}"/>
               </a:ext>
             </a:extLst>
           </p:cNvPr>
@@ -12193,10 +12186,10 @@
           <p:cNvPr id="28" name="Rectangle 27">
             <a:extLst>
               <a:ext uri="{FF2B5EF4-FFF2-40B4-BE49-F238E27FC236}">
-                <a16:creationId xmlns:a16="http://schemas.microsoft.com/office/drawing/2014/main" xmlns="" id="{3E443FD7-A66B-4AA0-872D-B088B9BC5F17}"/>
+                <a16:creationId xmlns:a16="http://schemas.microsoft.com/office/drawing/2014/main" id="{3E443FD7-A66B-4AA0-872D-B088B9BC5F17}"/>
               </a:ext>
               <a:ext uri="{C183D7F6-B498-43B3-948B-1728B52AA6E4}">
-                <adec:decorative xmlns:adec="http://schemas.microsoft.com/office/drawing/2017/decorative" xmlns="" val="1"/>
+                <adec:decorative xmlns:adec="http://schemas.microsoft.com/office/drawing/2017/decorative" val="1"/>
               </a:ext>
             </a:extLst>
           </p:cNvPr>
@@ -12206,7 +12199,7 @@
           <p:nvPr>
             <p:extLst>
               <p:ext uri="{386F3935-93C4-4BCD-93E2-E3B085C9AB24}">
-                <p16:designElem xmlns:p16="http://schemas.microsoft.com/office/powerpoint/2015/main" xmlns="" val="1"/>
+                <p16:designElem xmlns:p16="http://schemas.microsoft.com/office/powerpoint/2015/main" val="1"/>
               </p:ext>
             </p:extLst>
           </p:nvPr>
@@ -12253,7 +12246,7 @@
           <p:cNvPr id="2" name="TextBox 1">
             <a:extLst>
               <a:ext uri="{FF2B5EF4-FFF2-40B4-BE49-F238E27FC236}">
-                <a16:creationId xmlns:a16="http://schemas.microsoft.com/office/drawing/2014/main" xmlns="" id="{F555FB54-7145-41A4-B7AC-80E889E6930E}"/>
+                <a16:creationId xmlns:a16="http://schemas.microsoft.com/office/drawing/2014/main" id="{F555FB54-7145-41A4-B7AC-80E889E6930E}"/>
               </a:ext>
             </a:extLst>
           </p:cNvPr>
@@ -12315,10 +12308,10 @@
           <p:cNvPr id="30" name="Freeform: Shape 29">
             <a:extLst>
               <a:ext uri="{FF2B5EF4-FFF2-40B4-BE49-F238E27FC236}">
-                <a16:creationId xmlns:a16="http://schemas.microsoft.com/office/drawing/2014/main" xmlns="" id="{C04BE0EF-3561-49B4-9A29-F283168A91C7}"/>
+                <a16:creationId xmlns:a16="http://schemas.microsoft.com/office/drawing/2014/main" id="{C04BE0EF-3561-49B4-9A29-F283168A91C7}"/>
               </a:ext>
               <a:ext uri="{C183D7F6-B498-43B3-948B-1728B52AA6E4}">
-                <adec:decorative xmlns:adec="http://schemas.microsoft.com/office/drawing/2017/decorative" xmlns="" val="1"/>
+                <adec:decorative xmlns:adec="http://schemas.microsoft.com/office/drawing/2017/decorative" val="1"/>
               </a:ext>
             </a:extLst>
           </p:cNvPr>
@@ -12328,7 +12321,7 @@
           <p:nvPr>
             <p:extLst>
               <p:ext uri="{386F3935-93C4-4BCD-93E2-E3B085C9AB24}">
-                <p16:designElem xmlns:p16="http://schemas.microsoft.com/office/powerpoint/2015/main" xmlns="" val="1"/>
+                <p16:designElem xmlns:p16="http://schemas.microsoft.com/office/powerpoint/2015/main" val="1"/>
               </p:ext>
             </p:extLst>
           </p:nvPr>
@@ -13089,7 +13082,7 @@
           <p:cNvPr id="23" name="Graphic 5" descr="Cmd Terminal outline">
             <a:extLst>
               <a:ext uri="{FF2B5EF4-FFF2-40B4-BE49-F238E27FC236}">
-                <a16:creationId xmlns:a16="http://schemas.microsoft.com/office/drawing/2014/main" xmlns="" id="{B5C9A296-4AD9-4D40-87ED-1242EE6EE8FE}"/>
+                <a16:creationId xmlns:a16="http://schemas.microsoft.com/office/drawing/2014/main" id="{B5C9A296-4AD9-4D40-87ED-1242EE6EE8FE}"/>
               </a:ext>
             </a:extLst>
           </p:cNvPr>
@@ -13102,7 +13095,7 @@
           <a:blip r:embed="rId2">
             <a:extLst>
               <a:ext uri="{96DAC541-7B7A-43D3-8B79-37D633B846F1}">
-                <asvg:svgBlip xmlns:asvg="http://schemas.microsoft.com/office/drawing/2016/SVG/main" xmlns="" r:embed="rId3"/>
+                <asvg:svgBlip xmlns:asvg="http://schemas.microsoft.com/office/drawing/2016/SVG/main" r:embed="rId3"/>
               </a:ext>
             </a:extLst>
           </a:blip>
@@ -13153,7 +13146,7 @@
           <p:cNvPr id="2" name="Title 1">
             <a:extLst>
               <a:ext uri="{FF2B5EF4-FFF2-40B4-BE49-F238E27FC236}">
-                <a16:creationId xmlns:a16="http://schemas.microsoft.com/office/drawing/2014/main" xmlns="" id="{EC84C91D-5C9A-4516-BC67-968A5870A641}"/>
+                <a16:creationId xmlns:a16="http://schemas.microsoft.com/office/drawing/2014/main" id="{EC84C91D-5C9A-4516-BC67-968A5870A641}"/>
               </a:ext>
             </a:extLst>
           </p:cNvPr>
@@ -13181,7 +13174,7 @@
           <p:cNvPr id="6" name="Text Placeholder 2">
             <a:extLst>
               <a:ext uri="{FF2B5EF4-FFF2-40B4-BE49-F238E27FC236}">
-                <a16:creationId xmlns:a16="http://schemas.microsoft.com/office/drawing/2014/main" xmlns="" id="{B2492802-8B0C-4827-9851-9AFF7EA821E8}"/>
+                <a16:creationId xmlns:a16="http://schemas.microsoft.com/office/drawing/2014/main" id="{B2492802-8B0C-4827-9851-9AFF7EA821E8}"/>
               </a:ext>
             </a:extLst>
           </p:cNvPr>
@@ -13240,7 +13233,7 @@
           <p:cNvPr id="4" name="TextBox 3">
             <a:extLst>
               <a:ext uri="{FF2B5EF4-FFF2-40B4-BE49-F238E27FC236}">
-                <a16:creationId xmlns:a16="http://schemas.microsoft.com/office/drawing/2014/main" xmlns="" id="{9E665622-F0C0-44B9-9F84-863EB613C870}"/>
+                <a16:creationId xmlns:a16="http://schemas.microsoft.com/office/drawing/2014/main" id="{9E665622-F0C0-44B9-9F84-863EB613C870}"/>
               </a:ext>
             </a:extLst>
           </p:cNvPr>
@@ -13453,7 +13446,7 @@
           <p:cNvPr id="5" name="Text Placeholder 2">
             <a:extLst>
               <a:ext uri="{FF2B5EF4-FFF2-40B4-BE49-F238E27FC236}">
-                <a16:creationId xmlns:a16="http://schemas.microsoft.com/office/drawing/2014/main" xmlns="" id="{DB83BC58-8F38-4E0B-B376-21C7E7EA8044}"/>
+                <a16:creationId xmlns:a16="http://schemas.microsoft.com/office/drawing/2014/main" id="{DB83BC58-8F38-4E0B-B376-21C7E7EA8044}"/>
               </a:ext>
             </a:extLst>
           </p:cNvPr>
@@ -13695,7 +13688,7 @@
           <p:cNvPr id="2" name="Title 1">
             <a:extLst>
               <a:ext uri="{FF2B5EF4-FFF2-40B4-BE49-F238E27FC236}">
-                <a16:creationId xmlns:a16="http://schemas.microsoft.com/office/drawing/2014/main" xmlns="" id="{EC84C91D-5C9A-4516-BC67-968A5870A641}"/>
+                <a16:creationId xmlns:a16="http://schemas.microsoft.com/office/drawing/2014/main" id="{EC84C91D-5C9A-4516-BC67-968A5870A641}"/>
               </a:ext>
             </a:extLst>
           </p:cNvPr>
@@ -13723,7 +13716,7 @@
           <p:cNvPr id="6" name="Text Placeholder 2">
             <a:extLst>
               <a:ext uri="{FF2B5EF4-FFF2-40B4-BE49-F238E27FC236}">
-                <a16:creationId xmlns:a16="http://schemas.microsoft.com/office/drawing/2014/main" xmlns="" id="{B2492802-8B0C-4827-9851-9AFF7EA821E8}"/>
+                <a16:creationId xmlns:a16="http://schemas.microsoft.com/office/drawing/2014/main" id="{B2492802-8B0C-4827-9851-9AFF7EA821E8}"/>
               </a:ext>
             </a:extLst>
           </p:cNvPr>
@@ -13799,7 +13792,7 @@
           <p:cNvPr id="7" name="TextBox 6">
             <a:extLst>
               <a:ext uri="{FF2B5EF4-FFF2-40B4-BE49-F238E27FC236}">
-                <a16:creationId xmlns:a16="http://schemas.microsoft.com/office/drawing/2014/main" xmlns="" id="{A64584C6-93C5-4320-9BAA-82F80ECEFE7B}"/>
+                <a16:creationId xmlns:a16="http://schemas.microsoft.com/office/drawing/2014/main" id="{A64584C6-93C5-4320-9BAA-82F80ECEFE7B}"/>
               </a:ext>
             </a:extLst>
           </p:cNvPr>
@@ -14058,10 +14051,10 @@
           <p:cNvPr id="29" name="Rectangle 28">
             <a:extLst>
               <a:ext uri="{FF2B5EF4-FFF2-40B4-BE49-F238E27FC236}">
-                <a16:creationId xmlns:a16="http://schemas.microsoft.com/office/drawing/2014/main" xmlns="" id="{91F32EBA-ED97-466E-8CFA-8382584155D0}"/>
+                <a16:creationId xmlns:a16="http://schemas.microsoft.com/office/drawing/2014/main" id="{91F32EBA-ED97-466E-8CFA-8382584155D0}"/>
               </a:ext>
               <a:ext uri="{C183D7F6-B498-43B3-948B-1728B52AA6E4}">
-                <adec:decorative xmlns:adec="http://schemas.microsoft.com/office/drawing/2017/decorative" xmlns="" val="1"/>
+                <adec:decorative xmlns:adec="http://schemas.microsoft.com/office/drawing/2017/decorative" val="1"/>
               </a:ext>
             </a:extLst>
           </p:cNvPr>
@@ -14071,7 +14064,7 @@
           <p:nvPr>
             <p:extLst>
               <p:ext uri="{386F3935-93C4-4BCD-93E2-E3B085C9AB24}">
-                <p16:designElem xmlns:p16="http://schemas.microsoft.com/office/powerpoint/2015/main" xmlns="" val="1"/>
+                <p16:designElem xmlns:p16="http://schemas.microsoft.com/office/powerpoint/2015/main" val="1"/>
               </p:ext>
             </p:extLst>
           </p:nvPr>
@@ -14147,7 +14140,7 @@
           <p:cNvPr id="2" name="TextBox 1">
             <a:extLst>
               <a:ext uri="{FF2B5EF4-FFF2-40B4-BE49-F238E27FC236}">
-                <a16:creationId xmlns:a16="http://schemas.microsoft.com/office/drawing/2014/main" xmlns="" id="{F555FB54-7145-41A4-B7AC-80E889E6930E}"/>
+                <a16:creationId xmlns:a16="http://schemas.microsoft.com/office/drawing/2014/main" id="{F555FB54-7145-41A4-B7AC-80E889E6930E}"/>
               </a:ext>
             </a:extLst>
           </p:cNvPr>
@@ -14211,10 +14204,10 @@
           <p:cNvPr id="31" name="Freeform: Shape 30">
             <a:extLst>
               <a:ext uri="{FF2B5EF4-FFF2-40B4-BE49-F238E27FC236}">
-                <a16:creationId xmlns:a16="http://schemas.microsoft.com/office/drawing/2014/main" xmlns="" id="{62A38935-BB53-4DF7-A56E-48DD25B685D7}"/>
+                <a16:creationId xmlns:a16="http://schemas.microsoft.com/office/drawing/2014/main" id="{62A38935-BB53-4DF7-A56E-48DD25B685D7}"/>
               </a:ext>
               <a:ext uri="{C183D7F6-B498-43B3-948B-1728B52AA6E4}">
-                <adec:decorative xmlns:adec="http://schemas.microsoft.com/office/drawing/2017/decorative" xmlns="" val="1"/>
+                <adec:decorative xmlns:adec="http://schemas.microsoft.com/office/drawing/2017/decorative" val="1"/>
               </a:ext>
             </a:extLst>
           </p:cNvPr>
@@ -14224,7 +14217,7 @@
           <p:nvPr>
             <p:extLst>
               <p:ext uri="{386F3935-93C4-4BCD-93E2-E3B085C9AB24}">
-                <p16:designElem xmlns:p16="http://schemas.microsoft.com/office/powerpoint/2015/main" xmlns="" val="1"/>
+                <p16:designElem xmlns:p16="http://schemas.microsoft.com/office/powerpoint/2015/main" val="1"/>
               </p:ext>
             </p:extLst>
           </p:nvPr>
@@ -15014,7 +15007,7 @@
           <p:cNvPr id="23" name="Graphic 5" descr="Cmd Terminal outline">
             <a:extLst>
               <a:ext uri="{FF2B5EF4-FFF2-40B4-BE49-F238E27FC236}">
-                <a16:creationId xmlns:a16="http://schemas.microsoft.com/office/drawing/2014/main" xmlns="" id="{B5C9A296-4AD9-4D40-87ED-1242EE6EE8FE}"/>
+                <a16:creationId xmlns:a16="http://schemas.microsoft.com/office/drawing/2014/main" id="{B5C9A296-4AD9-4D40-87ED-1242EE6EE8FE}"/>
               </a:ext>
             </a:extLst>
           </p:cNvPr>
@@ -15027,7 +15020,7 @@
           <a:blip r:embed="rId2">
             <a:extLst>
               <a:ext uri="{96DAC541-7B7A-43D3-8B79-37D633B846F1}">
-                <asvg:svgBlip xmlns:asvg="http://schemas.microsoft.com/office/drawing/2016/SVG/main" xmlns="" r:embed="rId3"/>
+                <asvg:svgBlip xmlns:asvg="http://schemas.microsoft.com/office/drawing/2016/SVG/main" r:embed="rId3"/>
               </a:ext>
             </a:extLst>
           </a:blip>
@@ -15079,7 +15072,7 @@
           <p:cNvPr id="2" name="Title 1">
             <a:extLst>
               <a:ext uri="{FF2B5EF4-FFF2-40B4-BE49-F238E27FC236}">
-                <a16:creationId xmlns:a16="http://schemas.microsoft.com/office/drawing/2014/main" xmlns="" id="{EC84C91D-5C9A-4516-BC67-968A5870A641}"/>
+                <a16:creationId xmlns:a16="http://schemas.microsoft.com/office/drawing/2014/main" id="{EC84C91D-5C9A-4516-BC67-968A5870A641}"/>
               </a:ext>
             </a:extLst>
           </p:cNvPr>
@@ -15107,7 +15100,7 @@
           <p:cNvPr id="6" name="Text Placeholder 2">
             <a:extLst>
               <a:ext uri="{FF2B5EF4-FFF2-40B4-BE49-F238E27FC236}">
-                <a16:creationId xmlns:a16="http://schemas.microsoft.com/office/drawing/2014/main" xmlns="" id="{B2492802-8B0C-4827-9851-9AFF7EA821E8}"/>
+                <a16:creationId xmlns:a16="http://schemas.microsoft.com/office/drawing/2014/main" id="{B2492802-8B0C-4827-9851-9AFF7EA821E8}"/>
               </a:ext>
             </a:extLst>
           </p:cNvPr>
@@ -15255,7 +15248,7 @@
           <p:cNvPr id="7" name="TextBox 6">
             <a:extLst>
               <a:ext uri="{FF2B5EF4-FFF2-40B4-BE49-F238E27FC236}">
-                <a16:creationId xmlns:a16="http://schemas.microsoft.com/office/drawing/2014/main" xmlns="" id="{A64584C6-93C5-4320-9BAA-82F80ECEFE7B}"/>
+                <a16:creationId xmlns:a16="http://schemas.microsoft.com/office/drawing/2014/main" id="{A64584C6-93C5-4320-9BAA-82F80ECEFE7B}"/>
               </a:ext>
             </a:extLst>
           </p:cNvPr>
@@ -15444,7 +15437,7 @@
           <p:cNvPr id="2" name="Title 1">
             <a:extLst>
               <a:ext uri="{FF2B5EF4-FFF2-40B4-BE49-F238E27FC236}">
-                <a16:creationId xmlns:a16="http://schemas.microsoft.com/office/drawing/2014/main" xmlns="" id="{EC84C91D-5C9A-4516-BC67-968A5870A641}"/>
+                <a16:creationId xmlns:a16="http://schemas.microsoft.com/office/drawing/2014/main" id="{EC84C91D-5C9A-4516-BC67-968A5870A641}"/>
               </a:ext>
             </a:extLst>
           </p:cNvPr>
@@ -15472,7 +15465,7 @@
           <p:cNvPr id="6" name="Text Placeholder 2">
             <a:extLst>
               <a:ext uri="{FF2B5EF4-FFF2-40B4-BE49-F238E27FC236}">
-                <a16:creationId xmlns:a16="http://schemas.microsoft.com/office/drawing/2014/main" xmlns="" id="{B2492802-8B0C-4827-9851-9AFF7EA821E8}"/>
+                <a16:creationId xmlns:a16="http://schemas.microsoft.com/office/drawing/2014/main" id="{B2492802-8B0C-4827-9851-9AFF7EA821E8}"/>
               </a:ext>
             </a:extLst>
           </p:cNvPr>
@@ -16104,7 +16097,7 @@
           <p:cNvPr id="2" name="Title 1">
             <a:extLst>
               <a:ext uri="{FF2B5EF4-FFF2-40B4-BE49-F238E27FC236}">
-                <a16:creationId xmlns:a16="http://schemas.microsoft.com/office/drawing/2014/main" xmlns="" id="{70FF309B-2583-460B-8EB0-29B8F916FD59}"/>
+                <a16:creationId xmlns:a16="http://schemas.microsoft.com/office/drawing/2014/main" id="{70FF309B-2583-460B-8EB0-29B8F916FD59}"/>
               </a:ext>
             </a:extLst>
           </p:cNvPr>
@@ -16134,7 +16127,7 @@
           <p:cNvPr id="4" name="Picture 4" descr="Graphical user interface, application&#10;&#10;Description automatically generated">
             <a:extLst>
               <a:ext uri="{FF2B5EF4-FFF2-40B4-BE49-F238E27FC236}">
-                <a16:creationId xmlns:a16="http://schemas.microsoft.com/office/drawing/2014/main" xmlns="" id="{EB0EECD3-EAF1-485D-BB11-B80B1F6D6711}"/>
+                <a16:creationId xmlns:a16="http://schemas.microsoft.com/office/drawing/2014/main" id="{EB0EECD3-EAF1-485D-BB11-B80B1F6D6711}"/>
               </a:ext>
             </a:extLst>
           </p:cNvPr>
@@ -16163,7 +16156,7 @@
           <p:cNvPr id="5" name="TextBox 4">
             <a:extLst>
               <a:ext uri="{FF2B5EF4-FFF2-40B4-BE49-F238E27FC236}">
-                <a16:creationId xmlns:a16="http://schemas.microsoft.com/office/drawing/2014/main" xmlns="" id="{9C7404C9-BD66-47D5-97F6-B2A47F394BEB}"/>
+                <a16:creationId xmlns:a16="http://schemas.microsoft.com/office/drawing/2014/main" id="{9C7404C9-BD66-47D5-97F6-B2A47F394BEB}"/>
               </a:ext>
             </a:extLst>
           </p:cNvPr>
@@ -16639,7 +16632,7 @@
           <p:cNvPr id="2" name="Title 1">
             <a:extLst>
               <a:ext uri="{FF2B5EF4-FFF2-40B4-BE49-F238E27FC236}">
-                <a16:creationId xmlns:a16="http://schemas.microsoft.com/office/drawing/2014/main" xmlns="" id="{62493C3D-C9E0-4540-9673-9F13C13C437C}"/>
+                <a16:creationId xmlns:a16="http://schemas.microsoft.com/office/drawing/2014/main" id="{62493C3D-C9E0-4540-9673-9F13C13C437C}"/>
               </a:ext>
             </a:extLst>
           </p:cNvPr>
@@ -16670,7 +16663,7 @@
           <p:cNvPr id="7" name="Picture 7" descr="A picture containing logo&#10;&#10;Description automatically generated">
             <a:extLst>
               <a:ext uri="{FF2B5EF4-FFF2-40B4-BE49-F238E27FC236}">
-                <a16:creationId xmlns:a16="http://schemas.microsoft.com/office/drawing/2014/main" xmlns="" id="{9B909DCA-D818-4FF4-90BB-0C58A086F11F}"/>
+                <a16:creationId xmlns:a16="http://schemas.microsoft.com/office/drawing/2014/main" id="{9B909DCA-D818-4FF4-90BB-0C58A086F11F}"/>
               </a:ext>
             </a:extLst>
           </p:cNvPr>
@@ -16699,7 +16692,7 @@
           <p:cNvPr id="8" name="TextBox 7">
             <a:extLst>
               <a:ext uri="{FF2B5EF4-FFF2-40B4-BE49-F238E27FC236}">
-                <a16:creationId xmlns:a16="http://schemas.microsoft.com/office/drawing/2014/main" xmlns="" id="{546D8B47-A5E1-4004-B688-93CF8784B2A8}"/>
+                <a16:creationId xmlns:a16="http://schemas.microsoft.com/office/drawing/2014/main" id="{546D8B47-A5E1-4004-B688-93CF8784B2A8}"/>
               </a:ext>
             </a:extLst>
           </p:cNvPr>
@@ -16745,7 +16738,7 @@
           <p:cNvPr id="9" name="TextBox 8">
             <a:extLst>
               <a:ext uri="{FF2B5EF4-FFF2-40B4-BE49-F238E27FC236}">
-                <a16:creationId xmlns:a16="http://schemas.microsoft.com/office/drawing/2014/main" xmlns="" id="{DE5FFDB7-6C3C-46EC-BA6D-E283BD541766}"/>
+                <a16:creationId xmlns:a16="http://schemas.microsoft.com/office/drawing/2014/main" id="{DE5FFDB7-6C3C-46EC-BA6D-E283BD541766}"/>
               </a:ext>
             </a:extLst>
           </p:cNvPr>
@@ -16855,7 +16848,7 @@
           <p:cNvPr id="10" name="TextBox 9">
             <a:extLst>
               <a:ext uri="{FF2B5EF4-FFF2-40B4-BE49-F238E27FC236}">
-                <a16:creationId xmlns:a16="http://schemas.microsoft.com/office/drawing/2014/main" xmlns="" id="{2420F987-4B46-4102-9791-D0C68C619AFD}"/>
+                <a16:creationId xmlns:a16="http://schemas.microsoft.com/office/drawing/2014/main" id="{2420F987-4B46-4102-9791-D0C68C619AFD}"/>
               </a:ext>
             </a:extLst>
           </p:cNvPr>
@@ -16913,7 +16906,7 @@
           <p:cNvPr id="11" name="TextBox 10">
             <a:extLst>
               <a:ext uri="{FF2B5EF4-FFF2-40B4-BE49-F238E27FC236}">
-                <a16:creationId xmlns:a16="http://schemas.microsoft.com/office/drawing/2014/main" xmlns="" id="{19C5FDAB-5B95-4CEC-84E8-93049D86A796}"/>
+                <a16:creationId xmlns:a16="http://schemas.microsoft.com/office/drawing/2014/main" id="{19C5FDAB-5B95-4CEC-84E8-93049D86A796}"/>
               </a:ext>
             </a:extLst>
           </p:cNvPr>
@@ -17289,7 +17282,7 @@
           <a:lstStyle/>
           <a:p>
             <a:r>
-              <a:rPr lang="en-US" dirty="0" smtClean="0">
+              <a:rPr lang="en-US" dirty="0">
                 <a:solidFill>
                   <a:srgbClr val="0000FF"/>
                 </a:solidFill>
@@ -17297,7 +17290,7 @@
               <a:t>Other package: </a:t>
             </a:r>
             <a:r>
-              <a:rPr lang="en-US" dirty="0" err="1" smtClean="0">
+              <a:rPr lang="en-US" dirty="0" err="1">
                 <a:solidFill>
                   <a:srgbClr val="0000FF"/>
                 </a:solidFill>
@@ -17347,7 +17340,7 @@
           <p:cNvPr id="2" name="Title 1">
             <a:extLst>
               <a:ext uri="{FF2B5EF4-FFF2-40B4-BE49-F238E27FC236}">
-                <a16:creationId xmlns:a16="http://schemas.microsoft.com/office/drawing/2014/main" xmlns="" id="{877D10EA-CD59-4350-BB0C-99CB1C0961A1}"/>
+                <a16:creationId xmlns:a16="http://schemas.microsoft.com/office/drawing/2014/main" id="{877D10EA-CD59-4350-BB0C-99CB1C0961A1}"/>
               </a:ext>
             </a:extLst>
           </p:cNvPr>
@@ -17382,7 +17375,7 @@
           <p:cNvPr id="3" name="Content Placeholder 2">
             <a:extLst>
               <a:ext uri="{FF2B5EF4-FFF2-40B4-BE49-F238E27FC236}">
-                <a16:creationId xmlns:a16="http://schemas.microsoft.com/office/drawing/2014/main" xmlns="" id="{89E5F0E5-73E8-4617-BDEB-8E315009BC2B}"/>
+                <a16:creationId xmlns:a16="http://schemas.microsoft.com/office/drawing/2014/main" id="{89E5F0E5-73E8-4617-BDEB-8E315009BC2B}"/>
               </a:ext>
             </a:extLst>
           </p:cNvPr>
@@ -17653,7 +17646,7 @@
           <p:cNvPr id="2" name="Title 1">
             <a:extLst>
               <a:ext uri="{FF2B5EF4-FFF2-40B4-BE49-F238E27FC236}">
-                <a16:creationId xmlns:a16="http://schemas.microsoft.com/office/drawing/2014/main" xmlns="" id="{62493C3D-C9E0-4540-9673-9F13C13C437C}"/>
+                <a16:creationId xmlns:a16="http://schemas.microsoft.com/office/drawing/2014/main" id="{62493C3D-C9E0-4540-9673-9F13C13C437C}"/>
               </a:ext>
             </a:extLst>
           </p:cNvPr>
@@ -17684,7 +17677,7 @@
           <p:cNvPr id="5" name="Picture 5" descr="Graphical user interface, application, Teams&#10;&#10;Description automatically generated">
             <a:extLst>
               <a:ext uri="{FF2B5EF4-FFF2-40B4-BE49-F238E27FC236}">
-                <a16:creationId xmlns:a16="http://schemas.microsoft.com/office/drawing/2014/main" xmlns="" id="{EB04CE62-DD21-4097-83E9-D49DD7DC67E4}"/>
+                <a16:creationId xmlns:a16="http://schemas.microsoft.com/office/drawing/2014/main" id="{EB04CE62-DD21-4097-83E9-D49DD7DC67E4}"/>
               </a:ext>
             </a:extLst>
           </p:cNvPr>
@@ -17713,7 +17706,7 @@
           <p:cNvPr id="6" name="TextBox 5">
             <a:extLst>
               <a:ext uri="{FF2B5EF4-FFF2-40B4-BE49-F238E27FC236}">
-                <a16:creationId xmlns:a16="http://schemas.microsoft.com/office/drawing/2014/main" xmlns="" id="{DA84DCCC-011D-4A38-A77E-9E0C23BB6C2C}"/>
+                <a16:creationId xmlns:a16="http://schemas.microsoft.com/office/drawing/2014/main" id="{DA84DCCC-011D-4A38-A77E-9E0C23BB6C2C}"/>
               </a:ext>
             </a:extLst>
           </p:cNvPr>
@@ -17959,7 +17952,7 @@
           <p:cNvPr id="2" name="Title 1">
             <a:extLst>
               <a:ext uri="{FF2B5EF4-FFF2-40B4-BE49-F238E27FC236}">
-                <a16:creationId xmlns:a16="http://schemas.microsoft.com/office/drawing/2014/main" xmlns="" id="{62493C3D-C9E0-4540-9673-9F13C13C437C}"/>
+                <a16:creationId xmlns:a16="http://schemas.microsoft.com/office/drawing/2014/main" id="{62493C3D-C9E0-4540-9673-9F13C13C437C}"/>
               </a:ext>
             </a:extLst>
           </p:cNvPr>
@@ -17990,7 +17983,7 @@
           <p:cNvPr id="8" name="TextBox 7">
             <a:extLst>
               <a:ext uri="{FF2B5EF4-FFF2-40B4-BE49-F238E27FC236}">
-                <a16:creationId xmlns:a16="http://schemas.microsoft.com/office/drawing/2014/main" xmlns="" id="{546D8B47-A5E1-4004-B688-93CF8784B2A8}"/>
+                <a16:creationId xmlns:a16="http://schemas.microsoft.com/office/drawing/2014/main" id="{546D8B47-A5E1-4004-B688-93CF8784B2A8}"/>
               </a:ext>
             </a:extLst>
           </p:cNvPr>
@@ -18036,7 +18029,7 @@
           <p:cNvPr id="9" name="TextBox 8">
             <a:extLst>
               <a:ext uri="{FF2B5EF4-FFF2-40B4-BE49-F238E27FC236}">
-                <a16:creationId xmlns:a16="http://schemas.microsoft.com/office/drawing/2014/main" xmlns="" id="{DE5FFDB7-6C3C-46EC-BA6D-E283BD541766}"/>
+                <a16:creationId xmlns:a16="http://schemas.microsoft.com/office/drawing/2014/main" id="{DE5FFDB7-6C3C-46EC-BA6D-E283BD541766}"/>
               </a:ext>
             </a:extLst>
           </p:cNvPr>
@@ -18114,7 +18107,7 @@
           <p:cNvPr id="11" name="TextBox 10">
             <a:extLst>
               <a:ext uri="{FF2B5EF4-FFF2-40B4-BE49-F238E27FC236}">
-                <a16:creationId xmlns:a16="http://schemas.microsoft.com/office/drawing/2014/main" xmlns="" id="{19C5FDAB-5B95-4CEC-84E8-93049D86A796}"/>
+                <a16:creationId xmlns:a16="http://schemas.microsoft.com/office/drawing/2014/main" id="{19C5FDAB-5B95-4CEC-84E8-93049D86A796}"/>
               </a:ext>
             </a:extLst>
           </p:cNvPr>
@@ -18223,7 +18216,7 @@
           <p:cNvPr id="3" name="Picture 4" descr="A picture containing drawing, flower&#10;&#10;Description automatically generated">
             <a:extLst>
               <a:ext uri="{FF2B5EF4-FFF2-40B4-BE49-F238E27FC236}">
-                <a16:creationId xmlns:a16="http://schemas.microsoft.com/office/drawing/2014/main" xmlns="" id="{61C8D6B0-ADDC-4B5E-A845-17105B219DDC}"/>
+                <a16:creationId xmlns:a16="http://schemas.microsoft.com/office/drawing/2014/main" id="{61C8D6B0-ADDC-4B5E-A845-17105B219DDC}"/>
               </a:ext>
             </a:extLst>
           </p:cNvPr>
@@ -18290,10 +18283,10 @@
           <p:cNvPr id="28" name="Rectangle 27">
             <a:extLst>
               <a:ext uri="{FF2B5EF4-FFF2-40B4-BE49-F238E27FC236}">
-                <a16:creationId xmlns:a16="http://schemas.microsoft.com/office/drawing/2014/main" xmlns="" id="{3E443FD7-A66B-4AA0-872D-B088B9BC5F17}"/>
+                <a16:creationId xmlns:a16="http://schemas.microsoft.com/office/drawing/2014/main" id="{3E443FD7-A66B-4AA0-872D-B088B9BC5F17}"/>
               </a:ext>
               <a:ext uri="{C183D7F6-B498-43B3-948B-1728B52AA6E4}">
-                <adec:decorative xmlns:adec="http://schemas.microsoft.com/office/drawing/2017/decorative" xmlns="" val="1"/>
+                <adec:decorative xmlns:adec="http://schemas.microsoft.com/office/drawing/2017/decorative" val="1"/>
               </a:ext>
             </a:extLst>
           </p:cNvPr>
@@ -18303,7 +18296,7 @@
           <p:nvPr>
             <p:extLst>
               <p:ext uri="{386F3935-93C4-4BCD-93E2-E3B085C9AB24}">
-                <p16:designElem xmlns:p16="http://schemas.microsoft.com/office/powerpoint/2015/main" xmlns="" val="1"/>
+                <p16:designElem xmlns:p16="http://schemas.microsoft.com/office/powerpoint/2015/main" val="1"/>
               </p:ext>
             </p:extLst>
           </p:nvPr>
@@ -18350,7 +18343,7 @@
           <p:cNvPr id="2" name="TextBox 1">
             <a:extLst>
               <a:ext uri="{FF2B5EF4-FFF2-40B4-BE49-F238E27FC236}">
-                <a16:creationId xmlns:a16="http://schemas.microsoft.com/office/drawing/2014/main" xmlns="" id="{F555FB54-7145-41A4-B7AC-80E889E6930E}"/>
+                <a16:creationId xmlns:a16="http://schemas.microsoft.com/office/drawing/2014/main" id="{F555FB54-7145-41A4-B7AC-80E889E6930E}"/>
               </a:ext>
             </a:extLst>
           </p:cNvPr>
@@ -18412,10 +18405,10 @@
           <p:cNvPr id="30" name="Freeform: Shape 29">
             <a:extLst>
               <a:ext uri="{FF2B5EF4-FFF2-40B4-BE49-F238E27FC236}">
-                <a16:creationId xmlns:a16="http://schemas.microsoft.com/office/drawing/2014/main" xmlns="" id="{C04BE0EF-3561-49B4-9A29-F283168A91C7}"/>
+                <a16:creationId xmlns:a16="http://schemas.microsoft.com/office/drawing/2014/main" id="{C04BE0EF-3561-49B4-9A29-F283168A91C7}"/>
               </a:ext>
               <a:ext uri="{C183D7F6-B498-43B3-948B-1728B52AA6E4}">
-                <adec:decorative xmlns:adec="http://schemas.microsoft.com/office/drawing/2017/decorative" xmlns="" val="1"/>
+                <adec:decorative xmlns:adec="http://schemas.microsoft.com/office/drawing/2017/decorative" val="1"/>
               </a:ext>
             </a:extLst>
           </p:cNvPr>
@@ -18425,7 +18418,7 @@
           <p:nvPr>
             <p:extLst>
               <p:ext uri="{386F3935-93C4-4BCD-93E2-E3B085C9AB24}">
-                <p16:designElem xmlns:p16="http://schemas.microsoft.com/office/powerpoint/2015/main" xmlns="" val="1"/>
+                <p16:designElem xmlns:p16="http://schemas.microsoft.com/office/powerpoint/2015/main" val="1"/>
               </p:ext>
             </p:extLst>
           </p:nvPr>
@@ -19186,7 +19179,7 @@
           <p:cNvPr id="23" name="Graphic 5" descr="Cmd Terminal outline">
             <a:extLst>
               <a:ext uri="{FF2B5EF4-FFF2-40B4-BE49-F238E27FC236}">
-                <a16:creationId xmlns:a16="http://schemas.microsoft.com/office/drawing/2014/main" xmlns="" id="{B5C9A296-4AD9-4D40-87ED-1242EE6EE8FE}"/>
+                <a16:creationId xmlns:a16="http://schemas.microsoft.com/office/drawing/2014/main" id="{B5C9A296-4AD9-4D40-87ED-1242EE6EE8FE}"/>
               </a:ext>
             </a:extLst>
           </p:cNvPr>
@@ -19199,7 +19192,7 @@
           <a:blip r:embed="rId2">
             <a:extLst>
               <a:ext uri="{96DAC541-7B7A-43D3-8B79-37D633B846F1}">
-                <asvg:svgBlip xmlns:asvg="http://schemas.microsoft.com/office/drawing/2016/SVG/main" xmlns="" r:embed="rId3"/>
+                <asvg:svgBlip xmlns:asvg="http://schemas.microsoft.com/office/drawing/2016/SVG/main" r:embed="rId3"/>
               </a:ext>
             </a:extLst>
           </a:blip>
@@ -19250,7 +19243,7 @@
           <p:cNvPr id="100" name="TextBox 99">
             <a:extLst>
               <a:ext uri="{FF2B5EF4-FFF2-40B4-BE49-F238E27FC236}">
-                <a16:creationId xmlns:a16="http://schemas.microsoft.com/office/drawing/2014/main" xmlns="" id="{34B35484-F4E2-4112-97FB-FBF571F70843}"/>
+                <a16:creationId xmlns:a16="http://schemas.microsoft.com/office/drawing/2014/main" id="{34B35484-F4E2-4112-97FB-FBF571F70843}"/>
               </a:ext>
             </a:extLst>
           </p:cNvPr>
@@ -19315,7 +19308,7 @@
           <p:cNvPr id="101" name="TextBox 100">
             <a:extLst>
               <a:ext uri="{FF2B5EF4-FFF2-40B4-BE49-F238E27FC236}">
-                <a16:creationId xmlns:a16="http://schemas.microsoft.com/office/drawing/2014/main" xmlns="" id="{5CBC9EEB-E16D-4762-B6F3-51F67C9FCE01}"/>
+                <a16:creationId xmlns:a16="http://schemas.microsoft.com/office/drawing/2014/main" id="{5CBC9EEB-E16D-4762-B6F3-51F67C9FCE01}"/>
               </a:ext>
             </a:extLst>
           </p:cNvPr>
@@ -19380,7 +19373,7 @@
           <p:cNvPr id="105" name="Rectangle 104">
             <a:extLst>
               <a:ext uri="{FF2B5EF4-FFF2-40B4-BE49-F238E27FC236}">
-                <a16:creationId xmlns:a16="http://schemas.microsoft.com/office/drawing/2014/main" xmlns="" id="{2E97DFEC-6564-46D2-BD99-45CA5B83B84A}"/>
+                <a16:creationId xmlns:a16="http://schemas.microsoft.com/office/drawing/2014/main" id="{2E97DFEC-6564-46D2-BD99-45CA5B83B84A}"/>
               </a:ext>
             </a:extLst>
           </p:cNvPr>
@@ -19455,7 +19448,7 @@
           <p:cNvPr id="106" name="Rectangle 105">
             <a:extLst>
               <a:ext uri="{FF2B5EF4-FFF2-40B4-BE49-F238E27FC236}">
-                <a16:creationId xmlns:a16="http://schemas.microsoft.com/office/drawing/2014/main" xmlns="" id="{DF4AD769-5634-43C4-B8A9-1F2152A8A6E0}"/>
+                <a16:creationId xmlns:a16="http://schemas.microsoft.com/office/drawing/2014/main" id="{DF4AD769-5634-43C4-B8A9-1F2152A8A6E0}"/>
               </a:ext>
             </a:extLst>
           </p:cNvPr>
@@ -19533,7 +19526,7 @@
           <p:cNvPr id="107" name="Rectangle 106">
             <a:extLst>
               <a:ext uri="{FF2B5EF4-FFF2-40B4-BE49-F238E27FC236}">
-                <a16:creationId xmlns:a16="http://schemas.microsoft.com/office/drawing/2014/main" xmlns="" id="{151BE2A7-7E63-4EFB-87E8-CED6A3BFEF9D}"/>
+                <a16:creationId xmlns:a16="http://schemas.microsoft.com/office/drawing/2014/main" id="{151BE2A7-7E63-4EFB-87E8-CED6A3BFEF9D}"/>
               </a:ext>
             </a:extLst>
           </p:cNvPr>
@@ -19608,7 +19601,7 @@
           <p:cNvPr id="109" name="Rectangle 108">
             <a:extLst>
               <a:ext uri="{FF2B5EF4-FFF2-40B4-BE49-F238E27FC236}">
-                <a16:creationId xmlns:a16="http://schemas.microsoft.com/office/drawing/2014/main" xmlns="" id="{DB8FBECC-8147-49D3-B4CF-3C03A51E2256}"/>
+                <a16:creationId xmlns:a16="http://schemas.microsoft.com/office/drawing/2014/main" id="{DB8FBECC-8147-49D3-B4CF-3C03A51E2256}"/>
               </a:ext>
             </a:extLst>
           </p:cNvPr>
@@ -19689,7 +19682,7 @@
           <p:cNvPr id="110" name="Rectangle 109">
             <a:extLst>
               <a:ext uri="{FF2B5EF4-FFF2-40B4-BE49-F238E27FC236}">
-                <a16:creationId xmlns:a16="http://schemas.microsoft.com/office/drawing/2014/main" xmlns="" id="{F89AA3C3-593A-463E-A55D-F747ED93DC79}"/>
+                <a16:creationId xmlns:a16="http://schemas.microsoft.com/office/drawing/2014/main" id="{F89AA3C3-593A-463E-A55D-F747ED93DC79}"/>
               </a:ext>
             </a:extLst>
           </p:cNvPr>
@@ -19767,7 +19760,7 @@
           <p:cNvPr id="111" name="Rectangle 110">
             <a:extLst>
               <a:ext uri="{FF2B5EF4-FFF2-40B4-BE49-F238E27FC236}">
-                <a16:creationId xmlns:a16="http://schemas.microsoft.com/office/drawing/2014/main" xmlns="" id="{F1B816D3-4234-43BF-8C04-FFB9E90C356B}"/>
+                <a16:creationId xmlns:a16="http://schemas.microsoft.com/office/drawing/2014/main" id="{F1B816D3-4234-43BF-8C04-FFB9E90C356B}"/>
               </a:ext>
             </a:extLst>
           </p:cNvPr>
@@ -19842,7 +19835,7 @@
           <p:cNvPr id="113" name="Rectangle 112">
             <a:extLst>
               <a:ext uri="{FF2B5EF4-FFF2-40B4-BE49-F238E27FC236}">
-                <a16:creationId xmlns:a16="http://schemas.microsoft.com/office/drawing/2014/main" xmlns="" id="{10170A6E-721E-4A5A-9C5C-135C6D7C943D}"/>
+                <a16:creationId xmlns:a16="http://schemas.microsoft.com/office/drawing/2014/main" id="{10170A6E-721E-4A5A-9C5C-135C6D7C943D}"/>
               </a:ext>
             </a:extLst>
           </p:cNvPr>
@@ -19923,7 +19916,7 @@
           <p:cNvPr id="114" name="Rectangle 113">
             <a:extLst>
               <a:ext uri="{FF2B5EF4-FFF2-40B4-BE49-F238E27FC236}">
-                <a16:creationId xmlns:a16="http://schemas.microsoft.com/office/drawing/2014/main" xmlns="" id="{35759107-3B41-43A2-8CBC-3492CC06A2BB}"/>
+                <a16:creationId xmlns:a16="http://schemas.microsoft.com/office/drawing/2014/main" id="{35759107-3B41-43A2-8CBC-3492CC06A2BB}"/>
               </a:ext>
             </a:extLst>
           </p:cNvPr>
@@ -20001,7 +19994,7 @@
           <p:cNvPr id="115" name="Rectangle 114">
             <a:extLst>
               <a:ext uri="{FF2B5EF4-FFF2-40B4-BE49-F238E27FC236}">
-                <a16:creationId xmlns:a16="http://schemas.microsoft.com/office/drawing/2014/main" xmlns="" id="{CFD947A2-D48A-4D7E-A82D-AC0A090783B2}"/>
+                <a16:creationId xmlns:a16="http://schemas.microsoft.com/office/drawing/2014/main" id="{CFD947A2-D48A-4D7E-A82D-AC0A090783B2}"/>
               </a:ext>
             </a:extLst>
           </p:cNvPr>
@@ -20076,7 +20069,7 @@
           <p:cNvPr id="117" name="TextBox 116">
             <a:extLst>
               <a:ext uri="{FF2B5EF4-FFF2-40B4-BE49-F238E27FC236}">
-                <a16:creationId xmlns:a16="http://schemas.microsoft.com/office/drawing/2014/main" xmlns="" id="{8F49857B-89A4-4B41-9957-96638A83A5F8}"/>
+                <a16:creationId xmlns:a16="http://schemas.microsoft.com/office/drawing/2014/main" id="{8F49857B-89A4-4B41-9957-96638A83A5F8}"/>
               </a:ext>
             </a:extLst>
           </p:cNvPr>
@@ -20141,7 +20134,7 @@
           <p:cNvPr id="118" name="TextBox 117">
             <a:extLst>
               <a:ext uri="{FF2B5EF4-FFF2-40B4-BE49-F238E27FC236}">
-                <a16:creationId xmlns:a16="http://schemas.microsoft.com/office/drawing/2014/main" xmlns="" id="{41F30B55-69C6-4430-9321-22750EEE21C4}"/>
+                <a16:creationId xmlns:a16="http://schemas.microsoft.com/office/drawing/2014/main" id="{41F30B55-69C6-4430-9321-22750EEE21C4}"/>
               </a:ext>
             </a:extLst>
           </p:cNvPr>
@@ -20206,7 +20199,7 @@
           <p:cNvPr id="119" name="TextBox 118">
             <a:extLst>
               <a:ext uri="{FF2B5EF4-FFF2-40B4-BE49-F238E27FC236}">
-                <a16:creationId xmlns:a16="http://schemas.microsoft.com/office/drawing/2014/main" xmlns="" id="{019D0B16-9910-4D05-99DB-1C13A32220D6}"/>
+                <a16:creationId xmlns:a16="http://schemas.microsoft.com/office/drawing/2014/main" id="{019D0B16-9910-4D05-99DB-1C13A32220D6}"/>
               </a:ext>
             </a:extLst>
           </p:cNvPr>
@@ -20271,7 +20264,7 @@
           <p:cNvPr id="103" name="TextBox 102">
             <a:extLst>
               <a:ext uri="{FF2B5EF4-FFF2-40B4-BE49-F238E27FC236}">
-                <a16:creationId xmlns:a16="http://schemas.microsoft.com/office/drawing/2014/main" xmlns="" id="{620EA50D-3069-4E9C-8FFC-BC546E3A15F4}"/>
+                <a16:creationId xmlns:a16="http://schemas.microsoft.com/office/drawing/2014/main" id="{620EA50D-3069-4E9C-8FFC-BC546E3A15F4}"/>
               </a:ext>
             </a:extLst>
           </p:cNvPr>
@@ -20336,7 +20329,7 @@
           <p:cNvPr id="255" name="Title 1">
             <a:extLst>
               <a:ext uri="{FF2B5EF4-FFF2-40B4-BE49-F238E27FC236}">
-                <a16:creationId xmlns:a16="http://schemas.microsoft.com/office/drawing/2014/main" xmlns="" id="{B54C3232-AE34-455E-BD45-D58574BAEE43}"/>
+                <a16:creationId xmlns:a16="http://schemas.microsoft.com/office/drawing/2014/main" id="{B54C3232-AE34-455E-BD45-D58574BAEE43}"/>
               </a:ext>
             </a:extLst>
           </p:cNvPr>
@@ -20446,7 +20439,7 @@
           <p:cNvPr id="11" name="TextBox 10">
             <a:extLst>
               <a:ext uri="{FF2B5EF4-FFF2-40B4-BE49-F238E27FC236}">
-                <a16:creationId xmlns:a16="http://schemas.microsoft.com/office/drawing/2014/main" xmlns="" id="{1AC35287-F8AC-44FD-969C-1E19E338840C}"/>
+                <a16:creationId xmlns:a16="http://schemas.microsoft.com/office/drawing/2014/main" id="{1AC35287-F8AC-44FD-969C-1E19E338840C}"/>
               </a:ext>
             </a:extLst>
           </p:cNvPr>
@@ -20481,7 +20474,7 @@
           <p:cNvPr id="145" name="Rectangle 144">
             <a:extLst>
               <a:ext uri="{FF2B5EF4-FFF2-40B4-BE49-F238E27FC236}">
-                <a16:creationId xmlns:a16="http://schemas.microsoft.com/office/drawing/2014/main" xmlns="" id="{1D3C067D-03C1-422B-AFBD-D0D941D4A492}"/>
+                <a16:creationId xmlns:a16="http://schemas.microsoft.com/office/drawing/2014/main" id="{1D3C067D-03C1-422B-AFBD-D0D941D4A492}"/>
               </a:ext>
             </a:extLst>
           </p:cNvPr>
@@ -20567,7 +20560,7 @@
           <p:cNvPr id="146" name="Rectangle 145">
             <a:extLst>
               <a:ext uri="{FF2B5EF4-FFF2-40B4-BE49-F238E27FC236}">
-                <a16:creationId xmlns:a16="http://schemas.microsoft.com/office/drawing/2014/main" xmlns="" id="{98BB993D-62F0-4E36-877E-136A65BD7E28}"/>
+                <a16:creationId xmlns:a16="http://schemas.microsoft.com/office/drawing/2014/main" id="{98BB993D-62F0-4E36-877E-136A65BD7E28}"/>
               </a:ext>
             </a:extLst>
           </p:cNvPr>
@@ -20653,7 +20646,7 @@
           <p:cNvPr id="147" name="Rectangle 146">
             <a:extLst>
               <a:ext uri="{FF2B5EF4-FFF2-40B4-BE49-F238E27FC236}">
-                <a16:creationId xmlns:a16="http://schemas.microsoft.com/office/drawing/2014/main" xmlns="" id="{B3AA48EE-5A75-4609-AA59-DD81E6B6F59A}"/>
+                <a16:creationId xmlns:a16="http://schemas.microsoft.com/office/drawing/2014/main" id="{B3AA48EE-5A75-4609-AA59-DD81E6B6F59A}"/>
               </a:ext>
             </a:extLst>
           </p:cNvPr>
@@ -20739,7 +20732,7 @@
           <p:cNvPr id="148" name="Rectangle 147">
             <a:extLst>
               <a:ext uri="{FF2B5EF4-FFF2-40B4-BE49-F238E27FC236}">
-                <a16:creationId xmlns:a16="http://schemas.microsoft.com/office/drawing/2014/main" xmlns="" id="{03BE579C-697F-40B7-A28F-685440BE5934}"/>
+                <a16:creationId xmlns:a16="http://schemas.microsoft.com/office/drawing/2014/main" id="{03BE579C-697F-40B7-A28F-685440BE5934}"/>
               </a:ext>
             </a:extLst>
           </p:cNvPr>
@@ -20820,7 +20813,7 @@
           <p:cNvPr id="149" name="Rectangle 148">
             <a:extLst>
               <a:ext uri="{FF2B5EF4-FFF2-40B4-BE49-F238E27FC236}">
-                <a16:creationId xmlns:a16="http://schemas.microsoft.com/office/drawing/2014/main" xmlns="" id="{A09685AC-5DD2-4DCF-9749-E63A7B960431}"/>
+                <a16:creationId xmlns:a16="http://schemas.microsoft.com/office/drawing/2014/main" id="{A09685AC-5DD2-4DCF-9749-E63A7B960431}"/>
               </a:ext>
             </a:extLst>
           </p:cNvPr>
@@ -20898,7 +20891,7 @@
           <p:cNvPr id="150" name="Rectangle 149">
             <a:extLst>
               <a:ext uri="{FF2B5EF4-FFF2-40B4-BE49-F238E27FC236}">
-                <a16:creationId xmlns:a16="http://schemas.microsoft.com/office/drawing/2014/main" xmlns="" id="{F62843A2-3A8F-420D-A7FB-4F22CF82A5C7}"/>
+                <a16:creationId xmlns:a16="http://schemas.microsoft.com/office/drawing/2014/main" id="{F62843A2-3A8F-420D-A7FB-4F22CF82A5C7}"/>
               </a:ext>
             </a:extLst>
           </p:cNvPr>
@@ -20973,7 +20966,7 @@
           <p:cNvPr id="151" name="TextBox 150">
             <a:extLst>
               <a:ext uri="{FF2B5EF4-FFF2-40B4-BE49-F238E27FC236}">
-                <a16:creationId xmlns:a16="http://schemas.microsoft.com/office/drawing/2014/main" xmlns="" id="{E6F88B54-AB97-47F5-B2D8-319775B8CB1B}"/>
+                <a16:creationId xmlns:a16="http://schemas.microsoft.com/office/drawing/2014/main" id="{E6F88B54-AB97-47F5-B2D8-319775B8CB1B}"/>
               </a:ext>
             </a:extLst>
           </p:cNvPr>
@@ -21019,7 +21012,7 @@
           <p:cNvPr id="152" name="TextBox 151">
             <a:extLst>
               <a:ext uri="{FF2B5EF4-FFF2-40B4-BE49-F238E27FC236}">
-                <a16:creationId xmlns:a16="http://schemas.microsoft.com/office/drawing/2014/main" xmlns="" id="{75CD9B5B-5E8D-4AE8-AAA3-C6A19A23FF7D}"/>
+                <a16:creationId xmlns:a16="http://schemas.microsoft.com/office/drawing/2014/main" id="{75CD9B5B-5E8D-4AE8-AAA3-C6A19A23FF7D}"/>
               </a:ext>
             </a:extLst>
           </p:cNvPr>
@@ -21054,7 +21047,7 @@
           <p:cNvPr id="153" name="TextBox 152">
             <a:extLst>
               <a:ext uri="{FF2B5EF4-FFF2-40B4-BE49-F238E27FC236}">
-                <a16:creationId xmlns:a16="http://schemas.microsoft.com/office/drawing/2014/main" xmlns="" id="{9AD37877-5052-4474-9A7C-69649D2ABDCE}"/>
+                <a16:creationId xmlns:a16="http://schemas.microsoft.com/office/drawing/2014/main" id="{9AD37877-5052-4474-9A7C-69649D2ABDCE}"/>
               </a:ext>
             </a:extLst>
           </p:cNvPr>
@@ -21119,7 +21112,7 @@
           <p:cNvPr id="154" name="TextBox 153">
             <a:extLst>
               <a:ext uri="{FF2B5EF4-FFF2-40B4-BE49-F238E27FC236}">
-                <a16:creationId xmlns:a16="http://schemas.microsoft.com/office/drawing/2014/main" xmlns="" id="{D30A25A3-1D81-462F-91F4-162CECB74A8A}"/>
+                <a16:creationId xmlns:a16="http://schemas.microsoft.com/office/drawing/2014/main" id="{D30A25A3-1D81-462F-91F4-162CECB74A8A}"/>
               </a:ext>
             </a:extLst>
           </p:cNvPr>
@@ -21184,7 +21177,7 @@
           <p:cNvPr id="155" name="Rectangle 154">
             <a:extLst>
               <a:ext uri="{FF2B5EF4-FFF2-40B4-BE49-F238E27FC236}">
-                <a16:creationId xmlns:a16="http://schemas.microsoft.com/office/drawing/2014/main" xmlns="" id="{82634102-768A-420F-808E-69BDB40D94A6}"/>
+                <a16:creationId xmlns:a16="http://schemas.microsoft.com/office/drawing/2014/main" id="{82634102-768A-420F-808E-69BDB40D94A6}"/>
               </a:ext>
             </a:extLst>
           </p:cNvPr>
@@ -21259,7 +21252,7 @@
           <p:cNvPr id="156" name="Rectangle 155">
             <a:extLst>
               <a:ext uri="{FF2B5EF4-FFF2-40B4-BE49-F238E27FC236}">
-                <a16:creationId xmlns:a16="http://schemas.microsoft.com/office/drawing/2014/main" xmlns="" id="{2037A7B2-E097-4200-9B07-047FF5646C83}"/>
+                <a16:creationId xmlns:a16="http://schemas.microsoft.com/office/drawing/2014/main" id="{2037A7B2-E097-4200-9B07-047FF5646C83}"/>
               </a:ext>
             </a:extLst>
           </p:cNvPr>
@@ -21337,7 +21330,7 @@
           <p:cNvPr id="157" name="Rectangle 156">
             <a:extLst>
               <a:ext uri="{FF2B5EF4-FFF2-40B4-BE49-F238E27FC236}">
-                <a16:creationId xmlns:a16="http://schemas.microsoft.com/office/drawing/2014/main" xmlns="" id="{124D77EF-D17E-4942-80A3-1BAA295ACEA2}"/>
+                <a16:creationId xmlns:a16="http://schemas.microsoft.com/office/drawing/2014/main" id="{124D77EF-D17E-4942-80A3-1BAA295ACEA2}"/>
               </a:ext>
             </a:extLst>
           </p:cNvPr>
@@ -21412,7 +21405,7 @@
           <p:cNvPr id="158" name="Rectangle 157">
             <a:extLst>
               <a:ext uri="{FF2B5EF4-FFF2-40B4-BE49-F238E27FC236}">
-                <a16:creationId xmlns:a16="http://schemas.microsoft.com/office/drawing/2014/main" xmlns="" id="{7F2B9F3C-4157-4AA5-A571-E0718E788593}"/>
+                <a16:creationId xmlns:a16="http://schemas.microsoft.com/office/drawing/2014/main" id="{7F2B9F3C-4157-4AA5-A571-E0718E788593}"/>
               </a:ext>
             </a:extLst>
           </p:cNvPr>
@@ -21493,7 +21486,7 @@
           <p:cNvPr id="159" name="Rectangle 158">
             <a:extLst>
               <a:ext uri="{FF2B5EF4-FFF2-40B4-BE49-F238E27FC236}">
-                <a16:creationId xmlns:a16="http://schemas.microsoft.com/office/drawing/2014/main" xmlns="" id="{CB7AA174-D9EB-4F08-9534-52C1DAB0F1AE}"/>
+                <a16:creationId xmlns:a16="http://schemas.microsoft.com/office/drawing/2014/main" id="{CB7AA174-D9EB-4F08-9534-52C1DAB0F1AE}"/>
               </a:ext>
             </a:extLst>
           </p:cNvPr>
@@ -21571,7 +21564,7 @@
           <p:cNvPr id="160" name="Rectangle 159">
             <a:extLst>
               <a:ext uri="{FF2B5EF4-FFF2-40B4-BE49-F238E27FC236}">
-                <a16:creationId xmlns:a16="http://schemas.microsoft.com/office/drawing/2014/main" xmlns="" id="{09056C7E-1A86-49F7-8707-86E72C387856}"/>
+                <a16:creationId xmlns:a16="http://schemas.microsoft.com/office/drawing/2014/main" id="{09056C7E-1A86-49F7-8707-86E72C387856}"/>
               </a:ext>
             </a:extLst>
           </p:cNvPr>
@@ -21646,7 +21639,7 @@
           <p:cNvPr id="161" name="Rectangle 160">
             <a:extLst>
               <a:ext uri="{FF2B5EF4-FFF2-40B4-BE49-F238E27FC236}">
-                <a16:creationId xmlns:a16="http://schemas.microsoft.com/office/drawing/2014/main" xmlns="" id="{D3A86A78-B7EF-482E-9073-FB15DAA20D03}"/>
+                <a16:creationId xmlns:a16="http://schemas.microsoft.com/office/drawing/2014/main" id="{D3A86A78-B7EF-482E-9073-FB15DAA20D03}"/>
               </a:ext>
             </a:extLst>
           </p:cNvPr>
@@ -21727,7 +21720,7 @@
           <p:cNvPr id="162" name="Rectangle 161">
             <a:extLst>
               <a:ext uri="{FF2B5EF4-FFF2-40B4-BE49-F238E27FC236}">
-                <a16:creationId xmlns:a16="http://schemas.microsoft.com/office/drawing/2014/main" xmlns="" id="{B3351693-B50F-4854-98E1-01D9E47FFC3C}"/>
+                <a16:creationId xmlns:a16="http://schemas.microsoft.com/office/drawing/2014/main" id="{B3351693-B50F-4854-98E1-01D9E47FFC3C}"/>
               </a:ext>
             </a:extLst>
           </p:cNvPr>
@@ -21805,7 +21798,7 @@
           <p:cNvPr id="163" name="Rectangle 162">
             <a:extLst>
               <a:ext uri="{FF2B5EF4-FFF2-40B4-BE49-F238E27FC236}">
-                <a16:creationId xmlns:a16="http://schemas.microsoft.com/office/drawing/2014/main" xmlns="" id="{7BA19C08-830C-47A4-9E3C-99D75D8A0D22}"/>
+                <a16:creationId xmlns:a16="http://schemas.microsoft.com/office/drawing/2014/main" id="{7BA19C08-830C-47A4-9E3C-99D75D8A0D22}"/>
               </a:ext>
             </a:extLst>
           </p:cNvPr>
@@ -21880,7 +21873,7 @@
           <p:cNvPr id="164" name="TextBox 163">
             <a:extLst>
               <a:ext uri="{FF2B5EF4-FFF2-40B4-BE49-F238E27FC236}">
-                <a16:creationId xmlns:a16="http://schemas.microsoft.com/office/drawing/2014/main" xmlns="" id="{51260E5F-92F3-45E2-892C-C58C0866BE2D}"/>
+                <a16:creationId xmlns:a16="http://schemas.microsoft.com/office/drawing/2014/main" id="{51260E5F-92F3-45E2-892C-C58C0866BE2D}"/>
               </a:ext>
             </a:extLst>
           </p:cNvPr>
@@ -21945,7 +21938,7 @@
           <p:cNvPr id="165" name="TextBox 164">
             <a:extLst>
               <a:ext uri="{FF2B5EF4-FFF2-40B4-BE49-F238E27FC236}">
-                <a16:creationId xmlns:a16="http://schemas.microsoft.com/office/drawing/2014/main" xmlns="" id="{26A18C26-B860-4129-8ED8-D6D08595B381}"/>
+                <a16:creationId xmlns:a16="http://schemas.microsoft.com/office/drawing/2014/main" id="{26A18C26-B860-4129-8ED8-D6D08595B381}"/>
               </a:ext>
             </a:extLst>
           </p:cNvPr>
@@ -22010,7 +22003,7 @@
           <p:cNvPr id="166" name="TextBox 165">
             <a:extLst>
               <a:ext uri="{FF2B5EF4-FFF2-40B4-BE49-F238E27FC236}">
-                <a16:creationId xmlns:a16="http://schemas.microsoft.com/office/drawing/2014/main" xmlns="" id="{D49ECCE9-E28B-4B50-B69F-4002CC9BF783}"/>
+                <a16:creationId xmlns:a16="http://schemas.microsoft.com/office/drawing/2014/main" id="{D49ECCE9-E28B-4B50-B69F-4002CC9BF783}"/>
               </a:ext>
             </a:extLst>
           </p:cNvPr>
@@ -22075,7 +22068,7 @@
           <p:cNvPr id="167" name="TextBox 166">
             <a:extLst>
               <a:ext uri="{FF2B5EF4-FFF2-40B4-BE49-F238E27FC236}">
-                <a16:creationId xmlns:a16="http://schemas.microsoft.com/office/drawing/2014/main" xmlns="" id="{0751A4A0-1874-4DA8-B70F-22FAC41184C4}"/>
+                <a16:creationId xmlns:a16="http://schemas.microsoft.com/office/drawing/2014/main" id="{0751A4A0-1874-4DA8-B70F-22FAC41184C4}"/>
               </a:ext>
             </a:extLst>
           </p:cNvPr>
@@ -22140,7 +22133,7 @@
           <p:cNvPr id="168" name="Rectangle 167">
             <a:extLst>
               <a:ext uri="{FF2B5EF4-FFF2-40B4-BE49-F238E27FC236}">
-                <a16:creationId xmlns:a16="http://schemas.microsoft.com/office/drawing/2014/main" xmlns="" id="{4439AF03-8D5F-4C35-BD5E-D4B06727CBFC}"/>
+                <a16:creationId xmlns:a16="http://schemas.microsoft.com/office/drawing/2014/main" id="{4439AF03-8D5F-4C35-BD5E-D4B06727CBFC}"/>
               </a:ext>
             </a:extLst>
           </p:cNvPr>
@@ -22221,7 +22214,7 @@
           <p:cNvPr id="169" name="Rectangle 168">
             <a:extLst>
               <a:ext uri="{FF2B5EF4-FFF2-40B4-BE49-F238E27FC236}">
-                <a16:creationId xmlns:a16="http://schemas.microsoft.com/office/drawing/2014/main" xmlns="" id="{104AF757-BEBD-4B6D-8C5C-9C710F8238B0}"/>
+                <a16:creationId xmlns:a16="http://schemas.microsoft.com/office/drawing/2014/main" id="{104AF757-BEBD-4B6D-8C5C-9C710F8238B0}"/>
               </a:ext>
             </a:extLst>
           </p:cNvPr>
@@ -22299,7 +22292,7 @@
           <p:cNvPr id="170" name="Rectangle 169">
             <a:extLst>
               <a:ext uri="{FF2B5EF4-FFF2-40B4-BE49-F238E27FC236}">
-                <a16:creationId xmlns:a16="http://schemas.microsoft.com/office/drawing/2014/main" xmlns="" id="{99E592D1-47EC-4708-B867-7EAB3D5954EA}"/>
+                <a16:creationId xmlns:a16="http://schemas.microsoft.com/office/drawing/2014/main" id="{99E592D1-47EC-4708-B867-7EAB3D5954EA}"/>
               </a:ext>
             </a:extLst>
           </p:cNvPr>
@@ -22374,7 +22367,7 @@
           <p:cNvPr id="171" name="TextBox 170">
             <a:extLst>
               <a:ext uri="{FF2B5EF4-FFF2-40B4-BE49-F238E27FC236}">
-                <a16:creationId xmlns:a16="http://schemas.microsoft.com/office/drawing/2014/main" xmlns="" id="{B00F0793-9905-4A91-A3DA-7F94E34F049E}"/>
+                <a16:creationId xmlns:a16="http://schemas.microsoft.com/office/drawing/2014/main" id="{B00F0793-9905-4A91-A3DA-7F94E34F049E}"/>
               </a:ext>
             </a:extLst>
           </p:cNvPr>
@@ -22439,7 +22432,7 @@
           <p:cNvPr id="173" name="TextBox 172">
             <a:extLst>
               <a:ext uri="{FF2B5EF4-FFF2-40B4-BE49-F238E27FC236}">
-                <a16:creationId xmlns:a16="http://schemas.microsoft.com/office/drawing/2014/main" xmlns="" id="{C40FC81A-209F-4B2B-9DBD-8F9BDF590827}"/>
+                <a16:creationId xmlns:a16="http://schemas.microsoft.com/office/drawing/2014/main" id="{C40FC81A-209F-4B2B-9DBD-8F9BDF590827}"/>
               </a:ext>
             </a:extLst>
           </p:cNvPr>
@@ -22504,7 +22497,7 @@
           <p:cNvPr id="174" name="TextBox 173">
             <a:extLst>
               <a:ext uri="{FF2B5EF4-FFF2-40B4-BE49-F238E27FC236}">
-                <a16:creationId xmlns:a16="http://schemas.microsoft.com/office/drawing/2014/main" xmlns="" id="{36268ADF-48FF-49E8-90EC-0EA6EC015A78}"/>
+                <a16:creationId xmlns:a16="http://schemas.microsoft.com/office/drawing/2014/main" id="{36268ADF-48FF-49E8-90EC-0EA6EC015A78}"/>
               </a:ext>
             </a:extLst>
           </p:cNvPr>
@@ -22569,7 +22562,7 @@
           <p:cNvPr id="175" name="Rectangle 174">
             <a:extLst>
               <a:ext uri="{FF2B5EF4-FFF2-40B4-BE49-F238E27FC236}">
-                <a16:creationId xmlns:a16="http://schemas.microsoft.com/office/drawing/2014/main" xmlns="" id="{83C73EA6-D385-4A0C-B2BA-576D405A1D19}"/>
+                <a16:creationId xmlns:a16="http://schemas.microsoft.com/office/drawing/2014/main" id="{83C73EA6-D385-4A0C-B2BA-576D405A1D19}"/>
               </a:ext>
             </a:extLst>
           </p:cNvPr>
@@ -22644,7 +22637,7 @@
           <p:cNvPr id="176" name="Rectangle 175">
             <a:extLst>
               <a:ext uri="{FF2B5EF4-FFF2-40B4-BE49-F238E27FC236}">
-                <a16:creationId xmlns:a16="http://schemas.microsoft.com/office/drawing/2014/main" xmlns="" id="{BFD180BF-B4A6-4B1D-8FF5-96EC096AF7AC}"/>
+                <a16:creationId xmlns:a16="http://schemas.microsoft.com/office/drawing/2014/main" id="{BFD180BF-B4A6-4B1D-8FF5-96EC096AF7AC}"/>
               </a:ext>
             </a:extLst>
           </p:cNvPr>
@@ -22722,7 +22715,7 @@
           <p:cNvPr id="177" name="Rectangle 176">
             <a:extLst>
               <a:ext uri="{FF2B5EF4-FFF2-40B4-BE49-F238E27FC236}">
-                <a16:creationId xmlns:a16="http://schemas.microsoft.com/office/drawing/2014/main" xmlns="" id="{9A5B2C64-C0C3-4AB8-BFDB-5AB8C33951C0}"/>
+                <a16:creationId xmlns:a16="http://schemas.microsoft.com/office/drawing/2014/main" id="{9A5B2C64-C0C3-4AB8-BFDB-5AB8C33951C0}"/>
               </a:ext>
             </a:extLst>
           </p:cNvPr>
@@ -22797,7 +22790,7 @@
           <p:cNvPr id="178" name="Rectangle 177">
             <a:extLst>
               <a:ext uri="{FF2B5EF4-FFF2-40B4-BE49-F238E27FC236}">
-                <a16:creationId xmlns:a16="http://schemas.microsoft.com/office/drawing/2014/main" xmlns="" id="{330C391F-E154-498D-BB0B-FE6FCBA0D842}"/>
+                <a16:creationId xmlns:a16="http://schemas.microsoft.com/office/drawing/2014/main" id="{330C391F-E154-498D-BB0B-FE6FCBA0D842}"/>
               </a:ext>
             </a:extLst>
           </p:cNvPr>
@@ -22878,7 +22871,7 @@
           <p:cNvPr id="180" name="Rectangle 179">
             <a:extLst>
               <a:ext uri="{FF2B5EF4-FFF2-40B4-BE49-F238E27FC236}">
-                <a16:creationId xmlns:a16="http://schemas.microsoft.com/office/drawing/2014/main" xmlns="" id="{DE33C2BB-428C-40BD-BA1B-85BF323B9A72}"/>
+                <a16:creationId xmlns:a16="http://schemas.microsoft.com/office/drawing/2014/main" id="{DE33C2BB-428C-40BD-BA1B-85BF323B9A72}"/>
               </a:ext>
             </a:extLst>
           </p:cNvPr>
@@ -22956,7 +22949,7 @@
           <p:cNvPr id="181" name="Rectangle 180">
             <a:extLst>
               <a:ext uri="{FF2B5EF4-FFF2-40B4-BE49-F238E27FC236}">
-                <a16:creationId xmlns:a16="http://schemas.microsoft.com/office/drawing/2014/main" xmlns="" id="{9E5E5A85-FECC-4655-BFC5-010DEACE8818}"/>
+                <a16:creationId xmlns:a16="http://schemas.microsoft.com/office/drawing/2014/main" id="{9E5E5A85-FECC-4655-BFC5-010DEACE8818}"/>
               </a:ext>
             </a:extLst>
           </p:cNvPr>
@@ -23031,7 +23024,7 @@
           <p:cNvPr id="182" name="Rectangle 181">
             <a:extLst>
               <a:ext uri="{FF2B5EF4-FFF2-40B4-BE49-F238E27FC236}">
-                <a16:creationId xmlns:a16="http://schemas.microsoft.com/office/drawing/2014/main" xmlns="" id="{C365DDB1-3AD1-4AA6-8864-977C43404FBB}"/>
+                <a16:creationId xmlns:a16="http://schemas.microsoft.com/office/drawing/2014/main" id="{C365DDB1-3AD1-4AA6-8864-977C43404FBB}"/>
               </a:ext>
             </a:extLst>
           </p:cNvPr>
@@ -23112,7 +23105,7 @@
           <p:cNvPr id="183" name="Rectangle 182">
             <a:extLst>
               <a:ext uri="{FF2B5EF4-FFF2-40B4-BE49-F238E27FC236}">
-                <a16:creationId xmlns:a16="http://schemas.microsoft.com/office/drawing/2014/main" xmlns="" id="{5AE07337-7B69-4D9F-8CF0-A1AFBB6CC338}"/>
+                <a16:creationId xmlns:a16="http://schemas.microsoft.com/office/drawing/2014/main" id="{5AE07337-7B69-4D9F-8CF0-A1AFBB6CC338}"/>
               </a:ext>
             </a:extLst>
           </p:cNvPr>
@@ -23190,7 +23183,7 @@
           <p:cNvPr id="184" name="Rectangle 183">
             <a:extLst>
               <a:ext uri="{FF2B5EF4-FFF2-40B4-BE49-F238E27FC236}">
-                <a16:creationId xmlns:a16="http://schemas.microsoft.com/office/drawing/2014/main" xmlns="" id="{A5ABBB91-EF7F-480B-9B1C-4865EC95C964}"/>
+                <a16:creationId xmlns:a16="http://schemas.microsoft.com/office/drawing/2014/main" id="{A5ABBB91-EF7F-480B-9B1C-4865EC95C964}"/>
               </a:ext>
             </a:extLst>
           </p:cNvPr>
@@ -23265,7 +23258,7 @@
           <p:cNvPr id="185" name="TextBox 184">
             <a:extLst>
               <a:ext uri="{FF2B5EF4-FFF2-40B4-BE49-F238E27FC236}">
-                <a16:creationId xmlns:a16="http://schemas.microsoft.com/office/drawing/2014/main" xmlns="" id="{3354E02A-FD78-412D-B0F6-C5CA5B971C88}"/>
+                <a16:creationId xmlns:a16="http://schemas.microsoft.com/office/drawing/2014/main" id="{3354E02A-FD78-412D-B0F6-C5CA5B971C88}"/>
               </a:ext>
             </a:extLst>
           </p:cNvPr>
@@ -23330,7 +23323,7 @@
           <p:cNvPr id="186" name="TextBox 185">
             <a:extLst>
               <a:ext uri="{FF2B5EF4-FFF2-40B4-BE49-F238E27FC236}">
-                <a16:creationId xmlns:a16="http://schemas.microsoft.com/office/drawing/2014/main" xmlns="" id="{40845F65-77A0-4CC2-B781-2DD9933E29B7}"/>
+                <a16:creationId xmlns:a16="http://schemas.microsoft.com/office/drawing/2014/main" id="{40845F65-77A0-4CC2-B781-2DD9933E29B7}"/>
               </a:ext>
             </a:extLst>
           </p:cNvPr>
@@ -23395,7 +23388,7 @@
           <p:cNvPr id="187" name="TextBox 186">
             <a:extLst>
               <a:ext uri="{FF2B5EF4-FFF2-40B4-BE49-F238E27FC236}">
-                <a16:creationId xmlns:a16="http://schemas.microsoft.com/office/drawing/2014/main" xmlns="" id="{9062433E-2CBB-4A4F-A721-5A5128C02333}"/>
+                <a16:creationId xmlns:a16="http://schemas.microsoft.com/office/drawing/2014/main" id="{9062433E-2CBB-4A4F-A721-5A5128C02333}"/>
               </a:ext>
             </a:extLst>
           </p:cNvPr>
@@ -23460,7 +23453,7 @@
           <p:cNvPr id="188" name="TextBox 187">
             <a:extLst>
               <a:ext uri="{FF2B5EF4-FFF2-40B4-BE49-F238E27FC236}">
-                <a16:creationId xmlns:a16="http://schemas.microsoft.com/office/drawing/2014/main" xmlns="" id="{030D6ACE-7F2A-4097-966B-917B0251BE30}"/>
+                <a16:creationId xmlns:a16="http://schemas.microsoft.com/office/drawing/2014/main" id="{030D6ACE-7F2A-4097-966B-917B0251BE30}"/>
               </a:ext>
             </a:extLst>
           </p:cNvPr>
@@ -23525,7 +23518,7 @@
           <p:cNvPr id="189" name="TextBox 188">
             <a:extLst>
               <a:ext uri="{FF2B5EF4-FFF2-40B4-BE49-F238E27FC236}">
-                <a16:creationId xmlns:a16="http://schemas.microsoft.com/office/drawing/2014/main" xmlns="" id="{6C1A2552-A792-4AED-AC44-3B49D1228B32}"/>
+                <a16:creationId xmlns:a16="http://schemas.microsoft.com/office/drawing/2014/main" id="{6C1A2552-A792-4AED-AC44-3B49D1228B32}"/>
               </a:ext>
             </a:extLst>
           </p:cNvPr>
@@ -23571,7 +23564,7 @@
           <p:cNvPr id="190" name="Rectangle 189">
             <a:extLst>
               <a:ext uri="{FF2B5EF4-FFF2-40B4-BE49-F238E27FC236}">
-                <a16:creationId xmlns:a16="http://schemas.microsoft.com/office/drawing/2014/main" xmlns="" id="{9B3441E3-5D8F-403E-9BCD-B48CCF47ABC5}"/>
+                <a16:creationId xmlns:a16="http://schemas.microsoft.com/office/drawing/2014/main" id="{9B3441E3-5D8F-403E-9BCD-B48CCF47ABC5}"/>
               </a:ext>
             </a:extLst>
           </p:cNvPr>
@@ -23657,7 +23650,7 @@
           <p:cNvPr id="191" name="Rectangle 190">
             <a:extLst>
               <a:ext uri="{FF2B5EF4-FFF2-40B4-BE49-F238E27FC236}">
-                <a16:creationId xmlns:a16="http://schemas.microsoft.com/office/drawing/2014/main" xmlns="" id="{68B4E245-C8F5-4573-9579-DD776349555E}"/>
+                <a16:creationId xmlns:a16="http://schemas.microsoft.com/office/drawing/2014/main" id="{68B4E245-C8F5-4573-9579-DD776349555E}"/>
               </a:ext>
             </a:extLst>
           </p:cNvPr>
@@ -23743,7 +23736,7 @@
           <p:cNvPr id="192" name="Rectangle 191">
             <a:extLst>
               <a:ext uri="{FF2B5EF4-FFF2-40B4-BE49-F238E27FC236}">
-                <a16:creationId xmlns:a16="http://schemas.microsoft.com/office/drawing/2014/main" xmlns="" id="{88FBFEA2-4A0E-4213-916F-EB390BFC7943}"/>
+                <a16:creationId xmlns:a16="http://schemas.microsoft.com/office/drawing/2014/main" id="{88FBFEA2-4A0E-4213-916F-EB390BFC7943}"/>
               </a:ext>
             </a:extLst>
           </p:cNvPr>
@@ -23829,7 +23822,7 @@
           <p:cNvPr id="193" name="TextBox 192">
             <a:extLst>
               <a:ext uri="{FF2B5EF4-FFF2-40B4-BE49-F238E27FC236}">
-                <a16:creationId xmlns:a16="http://schemas.microsoft.com/office/drawing/2014/main" xmlns="" id="{91CD4C64-DB9B-4611-928F-40D6B452687C}"/>
+                <a16:creationId xmlns:a16="http://schemas.microsoft.com/office/drawing/2014/main" id="{91CD4C64-DB9B-4611-928F-40D6B452687C}"/>
               </a:ext>
             </a:extLst>
           </p:cNvPr>
@@ -23894,7 +23887,7 @@
           <p:cNvPr id="194" name="TextBox 193">
             <a:extLst>
               <a:ext uri="{FF2B5EF4-FFF2-40B4-BE49-F238E27FC236}">
-                <a16:creationId xmlns:a16="http://schemas.microsoft.com/office/drawing/2014/main" xmlns="" id="{891EE32B-7DA6-48C9-85C7-7859C5F762AE}"/>
+                <a16:creationId xmlns:a16="http://schemas.microsoft.com/office/drawing/2014/main" id="{891EE32B-7DA6-48C9-85C7-7859C5F762AE}"/>
               </a:ext>
             </a:extLst>
           </p:cNvPr>
@@ -23959,7 +23952,7 @@
           <p:cNvPr id="195" name="Rectangle 194">
             <a:extLst>
               <a:ext uri="{FF2B5EF4-FFF2-40B4-BE49-F238E27FC236}">
-                <a16:creationId xmlns:a16="http://schemas.microsoft.com/office/drawing/2014/main" xmlns="" id="{B6AD6097-B6EA-4C6E-B79A-7477F2B8C554}"/>
+                <a16:creationId xmlns:a16="http://schemas.microsoft.com/office/drawing/2014/main" id="{B6AD6097-B6EA-4C6E-B79A-7477F2B8C554}"/>
               </a:ext>
             </a:extLst>
           </p:cNvPr>
@@ -24034,7 +24027,7 @@
           <p:cNvPr id="196" name="Rectangle 195">
             <a:extLst>
               <a:ext uri="{FF2B5EF4-FFF2-40B4-BE49-F238E27FC236}">
-                <a16:creationId xmlns:a16="http://schemas.microsoft.com/office/drawing/2014/main" xmlns="" id="{385E836C-4505-4304-88B6-EF9430326DBB}"/>
+                <a16:creationId xmlns:a16="http://schemas.microsoft.com/office/drawing/2014/main" id="{385E836C-4505-4304-88B6-EF9430326DBB}"/>
               </a:ext>
             </a:extLst>
           </p:cNvPr>
@@ -24112,7 +24105,7 @@
           <p:cNvPr id="197" name="Rectangle 196">
             <a:extLst>
               <a:ext uri="{FF2B5EF4-FFF2-40B4-BE49-F238E27FC236}">
-                <a16:creationId xmlns:a16="http://schemas.microsoft.com/office/drawing/2014/main" xmlns="" id="{30093129-A4A9-4EB4-9229-E5B62CF22014}"/>
+                <a16:creationId xmlns:a16="http://schemas.microsoft.com/office/drawing/2014/main" id="{30093129-A4A9-4EB4-9229-E5B62CF22014}"/>
               </a:ext>
             </a:extLst>
           </p:cNvPr>
@@ -24187,7 +24180,7 @@
           <p:cNvPr id="198" name="Rectangle 197">
             <a:extLst>
               <a:ext uri="{FF2B5EF4-FFF2-40B4-BE49-F238E27FC236}">
-                <a16:creationId xmlns:a16="http://schemas.microsoft.com/office/drawing/2014/main" xmlns="" id="{FFBE5B45-3F69-48E8-AB1B-D2CCFA4016A1}"/>
+                <a16:creationId xmlns:a16="http://schemas.microsoft.com/office/drawing/2014/main" id="{FFBE5B45-3F69-48E8-AB1B-D2CCFA4016A1}"/>
               </a:ext>
             </a:extLst>
           </p:cNvPr>
@@ -24268,7 +24261,7 @@
           <p:cNvPr id="199" name="Rectangle 198">
             <a:extLst>
               <a:ext uri="{FF2B5EF4-FFF2-40B4-BE49-F238E27FC236}">
-                <a16:creationId xmlns:a16="http://schemas.microsoft.com/office/drawing/2014/main" xmlns="" id="{6F03316A-5EB2-4C8D-8507-56EA2E104FFD}"/>
+                <a16:creationId xmlns:a16="http://schemas.microsoft.com/office/drawing/2014/main" id="{6F03316A-5EB2-4C8D-8507-56EA2E104FFD}"/>
               </a:ext>
             </a:extLst>
           </p:cNvPr>
@@ -24346,7 +24339,7 @@
           <p:cNvPr id="200" name="Rectangle 199">
             <a:extLst>
               <a:ext uri="{FF2B5EF4-FFF2-40B4-BE49-F238E27FC236}">
-                <a16:creationId xmlns:a16="http://schemas.microsoft.com/office/drawing/2014/main" xmlns="" id="{82C97368-AABE-4B1B-ACE9-01459F9998DC}"/>
+                <a16:creationId xmlns:a16="http://schemas.microsoft.com/office/drawing/2014/main" id="{82C97368-AABE-4B1B-ACE9-01459F9998DC}"/>
               </a:ext>
             </a:extLst>
           </p:cNvPr>
@@ -24421,7 +24414,7 @@
           <p:cNvPr id="201" name="Rectangle 200">
             <a:extLst>
               <a:ext uri="{FF2B5EF4-FFF2-40B4-BE49-F238E27FC236}">
-                <a16:creationId xmlns:a16="http://schemas.microsoft.com/office/drawing/2014/main" xmlns="" id="{C8094D65-B3B2-449B-B054-C2A0DCCF61FD}"/>
+                <a16:creationId xmlns:a16="http://schemas.microsoft.com/office/drawing/2014/main" id="{C8094D65-B3B2-449B-B054-C2A0DCCF61FD}"/>
               </a:ext>
             </a:extLst>
           </p:cNvPr>
@@ -24502,7 +24495,7 @@
           <p:cNvPr id="202" name="Rectangle 201">
             <a:extLst>
               <a:ext uri="{FF2B5EF4-FFF2-40B4-BE49-F238E27FC236}">
-                <a16:creationId xmlns:a16="http://schemas.microsoft.com/office/drawing/2014/main" xmlns="" id="{B8D534EE-D0D5-4EA2-8238-60A21F388A40}"/>
+                <a16:creationId xmlns:a16="http://schemas.microsoft.com/office/drawing/2014/main" id="{B8D534EE-D0D5-4EA2-8238-60A21F388A40}"/>
               </a:ext>
             </a:extLst>
           </p:cNvPr>
@@ -24580,7 +24573,7 @@
           <p:cNvPr id="203" name="Rectangle 202">
             <a:extLst>
               <a:ext uri="{FF2B5EF4-FFF2-40B4-BE49-F238E27FC236}">
-                <a16:creationId xmlns:a16="http://schemas.microsoft.com/office/drawing/2014/main" xmlns="" id="{6CE051BF-6FE0-4D18-B450-ADA6EC8BF795}"/>
+                <a16:creationId xmlns:a16="http://schemas.microsoft.com/office/drawing/2014/main" id="{6CE051BF-6FE0-4D18-B450-ADA6EC8BF795}"/>
               </a:ext>
             </a:extLst>
           </p:cNvPr>
@@ -24655,7 +24648,7 @@
           <p:cNvPr id="204" name="TextBox 203">
             <a:extLst>
               <a:ext uri="{FF2B5EF4-FFF2-40B4-BE49-F238E27FC236}">
-                <a16:creationId xmlns:a16="http://schemas.microsoft.com/office/drawing/2014/main" xmlns="" id="{156B13AC-552E-4737-B207-6794E865FA77}"/>
+                <a16:creationId xmlns:a16="http://schemas.microsoft.com/office/drawing/2014/main" id="{156B13AC-552E-4737-B207-6794E865FA77}"/>
               </a:ext>
             </a:extLst>
           </p:cNvPr>
@@ -24720,7 +24713,7 @@
           <p:cNvPr id="205" name="TextBox 204">
             <a:extLst>
               <a:ext uri="{FF2B5EF4-FFF2-40B4-BE49-F238E27FC236}">
-                <a16:creationId xmlns:a16="http://schemas.microsoft.com/office/drawing/2014/main" xmlns="" id="{6382EF26-119F-4508-9C5D-E9A5A4941248}"/>
+                <a16:creationId xmlns:a16="http://schemas.microsoft.com/office/drawing/2014/main" id="{6382EF26-119F-4508-9C5D-E9A5A4941248}"/>
               </a:ext>
             </a:extLst>
           </p:cNvPr>
@@ -24785,7 +24778,7 @@
           <p:cNvPr id="206" name="TextBox 205">
             <a:extLst>
               <a:ext uri="{FF2B5EF4-FFF2-40B4-BE49-F238E27FC236}">
-                <a16:creationId xmlns:a16="http://schemas.microsoft.com/office/drawing/2014/main" xmlns="" id="{E451E13C-A274-4EE8-B6B0-65BA262536F4}"/>
+                <a16:creationId xmlns:a16="http://schemas.microsoft.com/office/drawing/2014/main" id="{E451E13C-A274-4EE8-B6B0-65BA262536F4}"/>
               </a:ext>
             </a:extLst>
           </p:cNvPr>
@@ -24850,7 +24843,7 @@
           <p:cNvPr id="207" name="TextBox 206">
             <a:extLst>
               <a:ext uri="{FF2B5EF4-FFF2-40B4-BE49-F238E27FC236}">
-                <a16:creationId xmlns:a16="http://schemas.microsoft.com/office/drawing/2014/main" xmlns="" id="{489E3681-F86A-4810-963C-6CBBF9514BB9}"/>
+                <a16:creationId xmlns:a16="http://schemas.microsoft.com/office/drawing/2014/main" id="{489E3681-F86A-4810-963C-6CBBF9514BB9}"/>
               </a:ext>
             </a:extLst>
           </p:cNvPr>
@@ -24915,7 +24908,7 @@
           <p:cNvPr id="208" name="TextBox 207">
             <a:extLst>
               <a:ext uri="{FF2B5EF4-FFF2-40B4-BE49-F238E27FC236}">
-                <a16:creationId xmlns:a16="http://schemas.microsoft.com/office/drawing/2014/main" xmlns="" id="{40AD4DB0-1D57-4AD9-8BDB-560786C4FE50}"/>
+                <a16:creationId xmlns:a16="http://schemas.microsoft.com/office/drawing/2014/main" id="{40AD4DB0-1D57-4AD9-8BDB-560786C4FE50}"/>
               </a:ext>
             </a:extLst>
           </p:cNvPr>
@@ -24980,7 +24973,7 @@
           <p:cNvPr id="12" name="Cross 11">
             <a:extLst>
               <a:ext uri="{FF2B5EF4-FFF2-40B4-BE49-F238E27FC236}">
-                <a16:creationId xmlns:a16="http://schemas.microsoft.com/office/drawing/2014/main" xmlns="" id="{BE68E268-90C6-4650-86CA-CFC3A9CFFD02}"/>
+                <a16:creationId xmlns:a16="http://schemas.microsoft.com/office/drawing/2014/main" id="{BE68E268-90C6-4650-86CA-CFC3A9CFFD02}"/>
               </a:ext>
             </a:extLst>
           </p:cNvPr>
@@ -25028,7 +25021,7 @@
           <p:cNvPr id="209" name="Cross 208">
             <a:extLst>
               <a:ext uri="{FF2B5EF4-FFF2-40B4-BE49-F238E27FC236}">
-                <a16:creationId xmlns:a16="http://schemas.microsoft.com/office/drawing/2014/main" xmlns="" id="{068EA667-24F6-4A59-981C-6FC182AA7994}"/>
+                <a16:creationId xmlns:a16="http://schemas.microsoft.com/office/drawing/2014/main" id="{068EA667-24F6-4A59-981C-6FC182AA7994}"/>
               </a:ext>
             </a:extLst>
           </p:cNvPr>
@@ -25076,7 +25069,7 @@
           <p:cNvPr id="13" name="Arrow: Right 12">
             <a:extLst>
               <a:ext uri="{FF2B5EF4-FFF2-40B4-BE49-F238E27FC236}">
-                <a16:creationId xmlns:a16="http://schemas.microsoft.com/office/drawing/2014/main" xmlns="" id="{CA92FE21-8E1B-4D6A-92F7-412CCECD3E7F}"/>
+                <a16:creationId xmlns:a16="http://schemas.microsoft.com/office/drawing/2014/main" id="{CA92FE21-8E1B-4D6A-92F7-412CCECD3E7F}"/>
               </a:ext>
             </a:extLst>
           </p:cNvPr>
@@ -25122,7 +25115,7 @@
           <p:cNvPr id="210" name="Arrow: Right 209">
             <a:extLst>
               <a:ext uri="{FF2B5EF4-FFF2-40B4-BE49-F238E27FC236}">
-                <a16:creationId xmlns:a16="http://schemas.microsoft.com/office/drawing/2014/main" xmlns="" id="{AC28BA07-76A8-444F-9D8C-BD7AA63452AB}"/>
+                <a16:creationId xmlns:a16="http://schemas.microsoft.com/office/drawing/2014/main" id="{AC28BA07-76A8-444F-9D8C-BD7AA63452AB}"/>
               </a:ext>
             </a:extLst>
           </p:cNvPr>
@@ -25168,7 +25161,7 @@
           <p:cNvPr id="211" name="TextBox 210">
             <a:extLst>
               <a:ext uri="{FF2B5EF4-FFF2-40B4-BE49-F238E27FC236}">
-                <a16:creationId xmlns:a16="http://schemas.microsoft.com/office/drawing/2014/main" xmlns="" id="{25251BD3-E5D8-43EB-AC25-3C6D7E351206}"/>
+                <a16:creationId xmlns:a16="http://schemas.microsoft.com/office/drawing/2014/main" id="{25251BD3-E5D8-43EB-AC25-3C6D7E351206}"/>
               </a:ext>
             </a:extLst>
           </p:cNvPr>
@@ -25203,7 +25196,7 @@
           <p:cNvPr id="212" name="TextBox 211">
             <a:extLst>
               <a:ext uri="{FF2B5EF4-FFF2-40B4-BE49-F238E27FC236}">
-                <a16:creationId xmlns:a16="http://schemas.microsoft.com/office/drawing/2014/main" xmlns="" id="{0DDE19D9-5869-4661-A3A6-749BC5B5C051}"/>
+                <a16:creationId xmlns:a16="http://schemas.microsoft.com/office/drawing/2014/main" id="{0DDE19D9-5869-4661-A3A6-749BC5B5C051}"/>
               </a:ext>
             </a:extLst>
           </p:cNvPr>
@@ -25246,7 +25239,7 @@
   <p:timing>
     <p:tnLst>
       <p:par>
-        <p:cTn xmlns:p14="http://schemas.microsoft.com/office/powerpoint/2010/main" id="1" dur="indefinite" restart="never" nodeType="tmRoot">
+        <p:cTn id="1" dur="indefinite" restart="never" nodeType="tmRoot">
           <p:childTnLst>
             <p:seq concurrent="1" nextAc="seek">
               <p:cTn id="2" dur="indefinite" nodeType="mainSeq">

</xml_diff>